<commit_message>
erweitert um das Ablaumodell des opt. Lastmanagements
</commit_message>
<xml_diff>
--- a/Funktionsmodell_Lastmanagement.pptx
+++ b/Funktionsmodell_Lastmanagement.pptx
@@ -5,23 +5,24 @@
     <p:sldMasterId id="2147483660" r:id="rId4"/>
   </p:sldMasterIdLst>
   <p:notesMasterIdLst>
-    <p:notesMasterId r:id="rId19"/>
+    <p:notesMasterId r:id="rId20"/>
   </p:notesMasterIdLst>
   <p:sldIdLst>
     <p:sldId id="256" r:id="rId5"/>
-    <p:sldId id="270" r:id="rId6"/>
-    <p:sldId id="261" r:id="rId7"/>
-    <p:sldId id="258" r:id="rId8"/>
-    <p:sldId id="259" r:id="rId9"/>
-    <p:sldId id="262" r:id="rId10"/>
-    <p:sldId id="263" r:id="rId11"/>
-    <p:sldId id="260" r:id="rId12"/>
-    <p:sldId id="264" r:id="rId13"/>
-    <p:sldId id="265" r:id="rId14"/>
-    <p:sldId id="267" r:id="rId15"/>
-    <p:sldId id="266" r:id="rId16"/>
-    <p:sldId id="268" r:id="rId17"/>
-    <p:sldId id="269" r:id="rId18"/>
+    <p:sldId id="271" r:id="rId6"/>
+    <p:sldId id="270" r:id="rId7"/>
+    <p:sldId id="261" r:id="rId8"/>
+    <p:sldId id="258" r:id="rId9"/>
+    <p:sldId id="259" r:id="rId10"/>
+    <p:sldId id="262" r:id="rId11"/>
+    <p:sldId id="263" r:id="rId12"/>
+    <p:sldId id="260" r:id="rId13"/>
+    <p:sldId id="264" r:id="rId14"/>
+    <p:sldId id="265" r:id="rId15"/>
+    <p:sldId id="267" r:id="rId16"/>
+    <p:sldId id="266" r:id="rId17"/>
+    <p:sldId id="268" r:id="rId18"/>
+    <p:sldId id="269" r:id="rId19"/>
   </p:sldIdLst>
   <p:sldSz cx="6858000" cy="9906000" type="A4"/>
   <p:notesSz cx="6797675" cy="9928225"/>
@@ -1239,7 +1240,7 @@
           <a:p>
             <a:fld id="{112938A6-4143-49DC-BAEE-2F8DAB512D29}" type="datetimeFigureOut">
               <a:rPr lang="de-DE" smtClean="0"/>
-              <a:t>18.08.2019</a:t>
+              <a:t>25.08.2019</a:t>
             </a:fld>
             <a:endParaRPr lang="de-DE"/>
           </a:p>
@@ -1637,7 +1638,7 @@
           <a:p>
             <a:fld id="{371517A1-6894-4FE9-8CD3-0FF8F1D4B5F9}" type="datetimeFigureOut">
               <a:rPr lang="de-DE" smtClean="0"/>
-              <a:t>18.08.2019</a:t>
+              <a:t>25.08.2019</a:t>
             </a:fld>
             <a:endParaRPr lang="de-DE"/>
           </a:p>
@@ -1807,7 +1808,7 @@
           <a:p>
             <a:fld id="{371517A1-6894-4FE9-8CD3-0FF8F1D4B5F9}" type="datetimeFigureOut">
               <a:rPr lang="de-DE" smtClean="0"/>
-              <a:t>18.08.2019</a:t>
+              <a:t>25.08.2019</a:t>
             </a:fld>
             <a:endParaRPr lang="de-DE"/>
           </a:p>
@@ -1987,7 +1988,7 @@
           <a:p>
             <a:fld id="{371517A1-6894-4FE9-8CD3-0FF8F1D4B5F9}" type="datetimeFigureOut">
               <a:rPr lang="de-DE" smtClean="0"/>
-              <a:t>18.08.2019</a:t>
+              <a:t>25.08.2019</a:t>
             </a:fld>
             <a:endParaRPr lang="de-DE"/>
           </a:p>
@@ -2157,7 +2158,7 @@
           <a:p>
             <a:fld id="{371517A1-6894-4FE9-8CD3-0FF8F1D4B5F9}" type="datetimeFigureOut">
               <a:rPr lang="de-DE" smtClean="0"/>
-              <a:t>18.08.2019</a:t>
+              <a:t>25.08.2019</a:t>
             </a:fld>
             <a:endParaRPr lang="de-DE"/>
           </a:p>
@@ -2401,7 +2402,7 @@
           <a:p>
             <a:fld id="{371517A1-6894-4FE9-8CD3-0FF8F1D4B5F9}" type="datetimeFigureOut">
               <a:rPr lang="de-DE" smtClean="0"/>
-              <a:t>18.08.2019</a:t>
+              <a:t>25.08.2019</a:t>
             </a:fld>
             <a:endParaRPr lang="de-DE"/>
           </a:p>
@@ -2633,7 +2634,7 @@
           <a:p>
             <a:fld id="{371517A1-6894-4FE9-8CD3-0FF8F1D4B5F9}" type="datetimeFigureOut">
               <a:rPr lang="de-DE" smtClean="0"/>
-              <a:t>18.08.2019</a:t>
+              <a:t>25.08.2019</a:t>
             </a:fld>
             <a:endParaRPr lang="de-DE"/>
           </a:p>
@@ -3000,7 +3001,7 @@
           <a:p>
             <a:fld id="{371517A1-6894-4FE9-8CD3-0FF8F1D4B5F9}" type="datetimeFigureOut">
               <a:rPr lang="de-DE" smtClean="0"/>
-              <a:t>18.08.2019</a:t>
+              <a:t>25.08.2019</a:t>
             </a:fld>
             <a:endParaRPr lang="de-DE"/>
           </a:p>
@@ -3118,7 +3119,7 @@
           <a:p>
             <a:fld id="{371517A1-6894-4FE9-8CD3-0FF8F1D4B5F9}" type="datetimeFigureOut">
               <a:rPr lang="de-DE" smtClean="0"/>
-              <a:t>18.08.2019</a:t>
+              <a:t>25.08.2019</a:t>
             </a:fld>
             <a:endParaRPr lang="de-DE"/>
           </a:p>
@@ -3213,7 +3214,7 @@
           <a:p>
             <a:fld id="{371517A1-6894-4FE9-8CD3-0FF8F1D4B5F9}" type="datetimeFigureOut">
               <a:rPr lang="de-DE" smtClean="0"/>
-              <a:t>18.08.2019</a:t>
+              <a:t>25.08.2019</a:t>
             </a:fld>
             <a:endParaRPr lang="de-DE"/>
           </a:p>
@@ -3490,7 +3491,7 @@
           <a:p>
             <a:fld id="{371517A1-6894-4FE9-8CD3-0FF8F1D4B5F9}" type="datetimeFigureOut">
               <a:rPr lang="de-DE" smtClean="0"/>
-              <a:t>18.08.2019</a:t>
+              <a:t>25.08.2019</a:t>
             </a:fld>
             <a:endParaRPr lang="de-DE"/>
           </a:p>
@@ -3747,7 +3748,7 @@
           <a:p>
             <a:fld id="{371517A1-6894-4FE9-8CD3-0FF8F1D4B5F9}" type="datetimeFigureOut">
               <a:rPr lang="de-DE" smtClean="0"/>
-              <a:t>18.08.2019</a:t>
+              <a:t>25.08.2019</a:t>
             </a:fld>
             <a:endParaRPr lang="de-DE"/>
           </a:p>
@@ -3960,7 +3961,7 @@
           <a:p>
             <a:fld id="{371517A1-6894-4FE9-8CD3-0FF8F1D4B5F9}" type="datetimeFigureOut">
               <a:rPr lang="de-DE" smtClean="0"/>
-              <a:t>18.08.2019</a:t>
+              <a:t>25.08.2019</a:t>
             </a:fld>
             <a:endParaRPr lang="de-DE"/>
           </a:p>
@@ -6021,13 +6022,6 @@
                 </a:rPr>
                 <a:t>CP2,connect</a:t>
               </a:r>
-              <a:endParaRPr lang="de-DE" sz="1200" baseline="-25000" dirty="0">
-                <a:solidFill>
-                  <a:prstClr val="black"/>
-                </a:solidFill>
-                <a:latin typeface="Arial" panose="020B0604020202020204" pitchFamily="34" charset="0"/>
-                <a:cs typeface="Arial" panose="020B0604020202020204" pitchFamily="34" charset="0"/>
-              </a:endParaRPr>
             </a:p>
           </p:txBody>
         </p:sp>
@@ -6597,6 +6591,887 @@
           <a:chExt cx="0" cy="0"/>
         </a:xfrm>
       </p:grpSpPr>
+      <p:grpSp>
+        <p:nvGrpSpPr>
+          <p:cNvPr id="4" name="Gruppieren 3">
+            <a:extLst>
+              <a:ext uri="{FF2B5EF4-FFF2-40B4-BE49-F238E27FC236}">
+                <a16:creationId xmlns:a16="http://schemas.microsoft.com/office/drawing/2014/main" id="{A47D2134-E7F3-427C-BE74-140BE853B3E8}"/>
+              </a:ext>
+            </a:extLst>
+          </p:cNvPr>
+          <p:cNvGrpSpPr/>
+          <p:nvPr/>
+        </p:nvGrpSpPr>
+        <p:grpSpPr>
+          <a:xfrm>
+            <a:off x="2604832" y="1244867"/>
+            <a:ext cx="1786193" cy="4474162"/>
+            <a:chOff x="2604832" y="1244867"/>
+            <a:chExt cx="1786193" cy="4474162"/>
+          </a:xfrm>
+        </p:grpSpPr>
+        <p:sp>
+          <p:nvSpPr>
+            <p:cNvPr id="5" name="Ellipse 4">
+              <a:extLst>
+                <a:ext uri="{FF2B5EF4-FFF2-40B4-BE49-F238E27FC236}">
+                  <a16:creationId xmlns:a16="http://schemas.microsoft.com/office/drawing/2014/main" id="{687765AE-DB57-44E7-8F4C-4438697636B9}"/>
+                </a:ext>
+              </a:extLst>
+            </p:cNvPr>
+            <p:cNvSpPr/>
+            <p:nvPr/>
+          </p:nvSpPr>
+          <p:spPr>
+            <a:xfrm>
+              <a:off x="2604836" y="1244867"/>
+              <a:ext cx="1648327" cy="433137"/>
+            </a:xfrm>
+            <a:prstGeom prst="ellipse">
+              <a:avLst/>
+            </a:prstGeom>
+            <a:solidFill>
+              <a:schemeClr val="accent6">
+                <a:lumMod val="40000"/>
+                <a:lumOff val="60000"/>
+              </a:schemeClr>
+            </a:solidFill>
+            <a:ln w="6350">
+              <a:solidFill>
+                <a:schemeClr val="tx1"/>
+              </a:solidFill>
+            </a:ln>
+          </p:spPr>
+          <p:style>
+            <a:lnRef idx="2">
+              <a:schemeClr val="accent1">
+                <a:shade val="50000"/>
+              </a:schemeClr>
+            </a:lnRef>
+            <a:fillRef idx="1">
+              <a:schemeClr val="accent1"/>
+            </a:fillRef>
+            <a:effectRef idx="0">
+              <a:schemeClr val="accent1"/>
+            </a:effectRef>
+            <a:fontRef idx="minor">
+              <a:schemeClr val="lt1"/>
+            </a:fontRef>
+          </p:style>
+          <p:txBody>
+            <a:bodyPr rtlCol="0" anchor="ctr"/>
+            <a:lstStyle/>
+            <a:p>
+              <a:pPr algn="ctr"/>
+              <a:r>
+                <a:rPr lang="de-DE" sz="800" dirty="0" err="1">
+                  <a:solidFill>
+                    <a:schemeClr val="tx1"/>
+                  </a:solidFill>
+                </a:rPr>
+                <a:t>Charge_or_wait</a:t>
+              </a:r>
+              <a:endParaRPr lang="de-DE" sz="800" dirty="0">
+                <a:solidFill>
+                  <a:schemeClr val="tx1"/>
+                </a:solidFill>
+              </a:endParaRPr>
+            </a:p>
+          </p:txBody>
+        </p:sp>
+        <p:sp>
+          <p:nvSpPr>
+            <p:cNvPr id="6" name="Ellipse 5">
+              <a:extLst>
+                <a:ext uri="{FF2B5EF4-FFF2-40B4-BE49-F238E27FC236}">
+                  <a16:creationId xmlns:a16="http://schemas.microsoft.com/office/drawing/2014/main" id="{BA3661D8-A384-4F67-9CAF-9129AB209B64}"/>
+                </a:ext>
+              </a:extLst>
+            </p:cNvPr>
+            <p:cNvSpPr/>
+            <p:nvPr/>
+          </p:nvSpPr>
+          <p:spPr>
+            <a:xfrm>
+              <a:off x="2604835" y="3240362"/>
+              <a:ext cx="1648327" cy="433137"/>
+            </a:xfrm>
+            <a:prstGeom prst="ellipse">
+              <a:avLst/>
+            </a:prstGeom>
+            <a:solidFill>
+              <a:schemeClr val="accent6">
+                <a:lumMod val="40000"/>
+                <a:lumOff val="60000"/>
+              </a:schemeClr>
+            </a:solidFill>
+            <a:ln w="6350">
+              <a:solidFill>
+                <a:schemeClr val="tx1"/>
+              </a:solidFill>
+            </a:ln>
+          </p:spPr>
+          <p:style>
+            <a:lnRef idx="2">
+              <a:schemeClr val="accent1">
+                <a:shade val="50000"/>
+              </a:schemeClr>
+            </a:lnRef>
+            <a:fillRef idx="1">
+              <a:schemeClr val="accent1"/>
+            </a:fillRef>
+            <a:effectRef idx="0">
+              <a:schemeClr val="accent1"/>
+            </a:effectRef>
+            <a:fontRef idx="minor">
+              <a:schemeClr val="lt1"/>
+            </a:fontRef>
+          </p:style>
+          <p:txBody>
+            <a:bodyPr rtlCol="0" anchor="ctr"/>
+            <a:lstStyle/>
+            <a:p>
+              <a:pPr algn="ctr"/>
+              <a:r>
+                <a:rPr lang="de-DE" sz="800" dirty="0">
+                  <a:solidFill>
+                    <a:schemeClr val="tx1"/>
+                  </a:solidFill>
+                </a:rPr>
+                <a:t>Charge_16A</a:t>
+              </a:r>
+            </a:p>
+          </p:txBody>
+        </p:sp>
+        <p:cxnSp>
+          <p:nvCxnSpPr>
+            <p:cNvPr id="7" name="Gerade Verbindung mit Pfeil 6">
+              <a:extLst>
+                <a:ext uri="{FF2B5EF4-FFF2-40B4-BE49-F238E27FC236}">
+                  <a16:creationId xmlns:a16="http://schemas.microsoft.com/office/drawing/2014/main" id="{5753B4CF-EA33-403B-8AFF-0012B6DBDAA3}"/>
+                </a:ext>
+              </a:extLst>
+            </p:cNvPr>
+            <p:cNvCxnSpPr>
+              <a:cxnSpLocks/>
+              <a:stCxn id="5" idx="4"/>
+              <a:endCxn id="18" idx="0"/>
+            </p:cNvCxnSpPr>
+            <p:nvPr/>
+          </p:nvCxnSpPr>
+          <p:spPr>
+            <a:xfrm flipH="1">
+              <a:off x="3428996" y="1678004"/>
+              <a:ext cx="4" cy="597427"/>
+            </a:xfrm>
+            <a:prstGeom prst="straightConnector1">
+              <a:avLst/>
+            </a:prstGeom>
+            <a:ln>
+              <a:solidFill>
+                <a:schemeClr val="tx1"/>
+              </a:solidFill>
+              <a:tailEnd type="triangle"/>
+            </a:ln>
+          </p:spPr>
+          <p:style>
+            <a:lnRef idx="1">
+              <a:schemeClr val="accent1"/>
+            </a:lnRef>
+            <a:fillRef idx="0">
+              <a:schemeClr val="accent1"/>
+            </a:fillRef>
+            <a:effectRef idx="0">
+              <a:schemeClr val="accent1"/>
+            </a:effectRef>
+            <a:fontRef idx="minor">
+              <a:schemeClr val="tx1"/>
+            </a:fontRef>
+          </p:style>
+        </p:cxnSp>
+        <p:sp>
+          <p:nvSpPr>
+            <p:cNvPr id="8" name="Textfeld 7">
+              <a:extLst>
+                <a:ext uri="{FF2B5EF4-FFF2-40B4-BE49-F238E27FC236}">
+                  <a16:creationId xmlns:a16="http://schemas.microsoft.com/office/drawing/2014/main" id="{A6D0088A-26C9-4836-A8C4-83C376C20290}"/>
+                </a:ext>
+              </a:extLst>
+            </p:cNvPr>
+            <p:cNvSpPr txBox="1"/>
+            <p:nvPr/>
+          </p:nvSpPr>
+          <p:spPr>
+            <a:xfrm>
+              <a:off x="3378875" y="1835667"/>
+              <a:ext cx="1012150" cy="184666"/>
+            </a:xfrm>
+            <a:prstGeom prst="rect">
+              <a:avLst/>
+            </a:prstGeom>
+            <a:noFill/>
+          </p:spPr>
+          <p:txBody>
+            <a:bodyPr wrap="square" rtlCol="0">
+              <a:spAutoFit/>
+            </a:bodyPr>
+            <a:lstStyle/>
+            <a:p>
+              <a:r>
+                <a:rPr lang="de-DE" sz="600" dirty="0" err="1"/>
+                <a:t>PKW_testzyklus</a:t>
+              </a:r>
+              <a:r>
+                <a:rPr lang="de-DE" sz="600" dirty="0"/>
+                <a:t> == </a:t>
+              </a:r>
+              <a:r>
+                <a:rPr lang="de-DE" sz="600" dirty="0" err="1"/>
+                <a:t>False</a:t>
+              </a:r>
+              <a:endParaRPr lang="de-DE" sz="600" dirty="0"/>
+            </a:p>
+          </p:txBody>
+        </p:sp>
+        <p:sp>
+          <p:nvSpPr>
+            <p:cNvPr id="9" name="Ellipse 8">
+              <a:extLst>
+                <a:ext uri="{FF2B5EF4-FFF2-40B4-BE49-F238E27FC236}">
+                  <a16:creationId xmlns:a16="http://schemas.microsoft.com/office/drawing/2014/main" id="{206D2B92-A69B-4C99-8C28-90244C08063D}"/>
+                </a:ext>
+              </a:extLst>
+            </p:cNvPr>
+            <p:cNvSpPr/>
+            <p:nvPr/>
+          </p:nvSpPr>
+          <p:spPr>
+            <a:xfrm>
+              <a:off x="2604835" y="4263127"/>
+              <a:ext cx="1648327" cy="433137"/>
+            </a:xfrm>
+            <a:prstGeom prst="ellipse">
+              <a:avLst/>
+            </a:prstGeom>
+            <a:solidFill>
+              <a:schemeClr val="accent6">
+                <a:lumMod val="40000"/>
+                <a:lumOff val="60000"/>
+              </a:schemeClr>
+            </a:solidFill>
+            <a:ln w="6350">
+              <a:solidFill>
+                <a:schemeClr val="tx1"/>
+              </a:solidFill>
+            </a:ln>
+          </p:spPr>
+          <p:style>
+            <a:lnRef idx="2">
+              <a:schemeClr val="accent1">
+                <a:shade val="50000"/>
+              </a:schemeClr>
+            </a:lnRef>
+            <a:fillRef idx="1">
+              <a:schemeClr val="accent1"/>
+            </a:fillRef>
+            <a:effectRef idx="0">
+              <a:schemeClr val="accent1"/>
+            </a:effectRef>
+            <a:fontRef idx="minor">
+              <a:schemeClr val="lt1"/>
+            </a:fontRef>
+          </p:style>
+          <p:txBody>
+            <a:bodyPr rtlCol="0" anchor="ctr"/>
+            <a:lstStyle/>
+            <a:p>
+              <a:pPr algn="ctr"/>
+              <a:r>
+                <a:rPr lang="de-DE" sz="800" dirty="0">
+                  <a:solidFill>
+                    <a:schemeClr val="tx1"/>
+                  </a:solidFill>
+                </a:rPr>
+                <a:t>Charge_15A</a:t>
+              </a:r>
+            </a:p>
+          </p:txBody>
+        </p:sp>
+        <p:cxnSp>
+          <p:nvCxnSpPr>
+            <p:cNvPr id="10" name="Gerade Verbindung mit Pfeil 9">
+              <a:extLst>
+                <a:ext uri="{FF2B5EF4-FFF2-40B4-BE49-F238E27FC236}">
+                  <a16:creationId xmlns:a16="http://schemas.microsoft.com/office/drawing/2014/main" id="{58DC58AA-2938-4E29-82C0-C9E06F70E01D}"/>
+                </a:ext>
+              </a:extLst>
+            </p:cNvPr>
+            <p:cNvCxnSpPr>
+              <a:cxnSpLocks/>
+              <a:endCxn id="9" idx="0"/>
+            </p:cNvCxnSpPr>
+            <p:nvPr/>
+          </p:nvCxnSpPr>
+          <p:spPr>
+            <a:xfrm flipH="1">
+              <a:off x="3428999" y="3672327"/>
+              <a:ext cx="1" cy="590800"/>
+            </a:xfrm>
+            <a:prstGeom prst="straightConnector1">
+              <a:avLst/>
+            </a:prstGeom>
+            <a:ln>
+              <a:solidFill>
+                <a:schemeClr val="tx1"/>
+              </a:solidFill>
+              <a:tailEnd type="triangle"/>
+            </a:ln>
+          </p:spPr>
+          <p:style>
+            <a:lnRef idx="1">
+              <a:schemeClr val="accent1"/>
+            </a:lnRef>
+            <a:fillRef idx="0">
+              <a:schemeClr val="accent1"/>
+            </a:fillRef>
+            <a:effectRef idx="0">
+              <a:schemeClr val="accent1"/>
+            </a:effectRef>
+            <a:fontRef idx="minor">
+              <a:schemeClr val="tx1"/>
+            </a:fontRef>
+          </p:style>
+        </p:cxnSp>
+        <p:sp>
+          <p:nvSpPr>
+            <p:cNvPr id="11" name="Ellipse 10">
+              <a:extLst>
+                <a:ext uri="{FF2B5EF4-FFF2-40B4-BE49-F238E27FC236}">
+                  <a16:creationId xmlns:a16="http://schemas.microsoft.com/office/drawing/2014/main" id="{C7BD1FFE-8B92-4686-97E7-ECBA91197BDD}"/>
+                </a:ext>
+              </a:extLst>
+            </p:cNvPr>
+            <p:cNvSpPr/>
+            <p:nvPr/>
+          </p:nvSpPr>
+          <p:spPr>
+            <a:xfrm>
+              <a:off x="2604835" y="5285892"/>
+              <a:ext cx="1648327" cy="433137"/>
+            </a:xfrm>
+            <a:prstGeom prst="ellipse">
+              <a:avLst/>
+            </a:prstGeom>
+            <a:solidFill>
+              <a:schemeClr val="accent6">
+                <a:lumMod val="40000"/>
+                <a:lumOff val="60000"/>
+              </a:schemeClr>
+            </a:solidFill>
+            <a:ln w="6350">
+              <a:solidFill>
+                <a:schemeClr val="tx1"/>
+              </a:solidFill>
+            </a:ln>
+          </p:spPr>
+          <p:style>
+            <a:lnRef idx="2">
+              <a:schemeClr val="accent1">
+                <a:shade val="50000"/>
+              </a:schemeClr>
+            </a:lnRef>
+            <a:fillRef idx="1">
+              <a:schemeClr val="accent1"/>
+            </a:fillRef>
+            <a:effectRef idx="0">
+              <a:schemeClr val="accent1"/>
+            </a:effectRef>
+            <a:fontRef idx="minor">
+              <a:schemeClr val="lt1"/>
+            </a:fontRef>
+          </p:style>
+          <p:txBody>
+            <a:bodyPr rtlCol="0" anchor="ctr"/>
+            <a:lstStyle/>
+            <a:p>
+              <a:pPr algn="ctr"/>
+              <a:r>
+                <a:rPr lang="de-DE" sz="800" dirty="0">
+                  <a:solidFill>
+                    <a:schemeClr val="tx1"/>
+                  </a:solidFill>
+                </a:rPr>
+                <a:t>Charge_6A</a:t>
+              </a:r>
+            </a:p>
+          </p:txBody>
+        </p:sp>
+        <p:cxnSp>
+          <p:nvCxnSpPr>
+            <p:cNvPr id="12" name="Gerade Verbindung mit Pfeil 11">
+              <a:extLst>
+                <a:ext uri="{FF2B5EF4-FFF2-40B4-BE49-F238E27FC236}">
+                  <a16:creationId xmlns:a16="http://schemas.microsoft.com/office/drawing/2014/main" id="{3132501B-2837-4FDD-8CC0-19D270922F4D}"/>
+                </a:ext>
+              </a:extLst>
+            </p:cNvPr>
+            <p:cNvCxnSpPr>
+              <a:cxnSpLocks/>
+              <a:endCxn id="11" idx="0"/>
+            </p:cNvCxnSpPr>
+            <p:nvPr/>
+          </p:nvCxnSpPr>
+          <p:spPr>
+            <a:xfrm>
+              <a:off x="3428999" y="4972058"/>
+              <a:ext cx="0" cy="313834"/>
+            </a:xfrm>
+            <a:prstGeom prst="straightConnector1">
+              <a:avLst/>
+            </a:prstGeom>
+            <a:ln>
+              <a:solidFill>
+                <a:schemeClr val="tx1"/>
+              </a:solidFill>
+              <a:prstDash val="lgDash"/>
+              <a:tailEnd type="triangle"/>
+            </a:ln>
+          </p:spPr>
+          <p:style>
+            <a:lnRef idx="1">
+              <a:schemeClr val="accent1"/>
+            </a:lnRef>
+            <a:fillRef idx="0">
+              <a:schemeClr val="accent1"/>
+            </a:fillRef>
+            <a:effectRef idx="0">
+              <a:schemeClr val="accent1"/>
+            </a:effectRef>
+            <a:fontRef idx="minor">
+              <a:schemeClr val="tx1"/>
+            </a:fontRef>
+          </p:style>
+        </p:cxnSp>
+        <p:cxnSp>
+          <p:nvCxnSpPr>
+            <p:cNvPr id="13" name="Gerade Verbindung mit Pfeil 12">
+              <a:extLst>
+                <a:ext uri="{FF2B5EF4-FFF2-40B4-BE49-F238E27FC236}">
+                  <a16:creationId xmlns:a16="http://schemas.microsoft.com/office/drawing/2014/main" id="{2D0CC33F-9BA4-47CF-A954-E24B5A230C2D}"/>
+                </a:ext>
+              </a:extLst>
+            </p:cNvPr>
+            <p:cNvCxnSpPr>
+              <a:cxnSpLocks/>
+            </p:cNvCxnSpPr>
+            <p:nvPr/>
+          </p:nvCxnSpPr>
+          <p:spPr>
+            <a:xfrm>
+              <a:off x="3428999" y="4696264"/>
+              <a:ext cx="0" cy="313834"/>
+            </a:xfrm>
+            <a:prstGeom prst="straightConnector1">
+              <a:avLst/>
+            </a:prstGeom>
+            <a:ln>
+              <a:solidFill>
+                <a:schemeClr val="tx1"/>
+              </a:solidFill>
+              <a:prstDash val="lgDash"/>
+              <a:tailEnd type="triangle"/>
+            </a:ln>
+          </p:spPr>
+          <p:style>
+            <a:lnRef idx="1">
+              <a:schemeClr val="accent1"/>
+            </a:lnRef>
+            <a:fillRef idx="0">
+              <a:schemeClr val="accent1"/>
+            </a:fillRef>
+            <a:effectRef idx="0">
+              <a:schemeClr val="accent1"/>
+            </a:effectRef>
+            <a:fontRef idx="minor">
+              <a:schemeClr val="tx1"/>
+            </a:fontRef>
+          </p:style>
+        </p:cxnSp>
+        <p:sp>
+          <p:nvSpPr>
+            <p:cNvPr id="14" name="Textfeld 13">
+              <a:extLst>
+                <a:ext uri="{FF2B5EF4-FFF2-40B4-BE49-F238E27FC236}">
+                  <a16:creationId xmlns:a16="http://schemas.microsoft.com/office/drawing/2014/main" id="{B88EBF46-0F23-41FE-8E50-D567D08F54A7}"/>
+                </a:ext>
+              </a:extLst>
+            </p:cNvPr>
+            <p:cNvSpPr txBox="1"/>
+            <p:nvPr/>
+          </p:nvSpPr>
+          <p:spPr>
+            <a:xfrm>
+              <a:off x="3378875" y="3840269"/>
+              <a:ext cx="759700" cy="184666"/>
+            </a:xfrm>
+            <a:prstGeom prst="rect">
+              <a:avLst/>
+            </a:prstGeom>
+            <a:noFill/>
+          </p:spPr>
+          <p:txBody>
+            <a:bodyPr wrap="square" rtlCol="0">
+              <a:spAutoFit/>
+            </a:bodyPr>
+            <a:lstStyle/>
+            <a:p>
+              <a:r>
+                <a:rPr lang="de-DE" sz="600" dirty="0"/>
+                <a:t>Delta_t1 == True</a:t>
+              </a:r>
+            </a:p>
+          </p:txBody>
+        </p:sp>
+        <p:sp>
+          <p:nvSpPr>
+            <p:cNvPr id="15" name="Textfeld 14">
+              <a:extLst>
+                <a:ext uri="{FF2B5EF4-FFF2-40B4-BE49-F238E27FC236}">
+                  <a16:creationId xmlns:a16="http://schemas.microsoft.com/office/drawing/2014/main" id="{3AF983B3-4587-4786-A03F-60689B638C22}"/>
+                </a:ext>
+              </a:extLst>
+            </p:cNvPr>
+            <p:cNvSpPr txBox="1"/>
+            <p:nvPr/>
+          </p:nvSpPr>
+          <p:spPr>
+            <a:xfrm>
+              <a:off x="3378875" y="4728166"/>
+              <a:ext cx="835932" cy="184666"/>
+            </a:xfrm>
+            <a:prstGeom prst="rect">
+              <a:avLst/>
+            </a:prstGeom>
+            <a:noFill/>
+          </p:spPr>
+          <p:txBody>
+            <a:bodyPr wrap="square" rtlCol="0">
+              <a:spAutoFit/>
+            </a:bodyPr>
+            <a:lstStyle/>
+            <a:p>
+              <a:r>
+                <a:rPr lang="de-DE" sz="600" dirty="0"/>
+                <a:t>Delta_t2 == True</a:t>
+              </a:r>
+            </a:p>
+          </p:txBody>
+        </p:sp>
+        <p:sp>
+          <p:nvSpPr>
+            <p:cNvPr id="16" name="Textfeld 15">
+              <a:extLst>
+                <a:ext uri="{FF2B5EF4-FFF2-40B4-BE49-F238E27FC236}">
+                  <a16:creationId xmlns:a16="http://schemas.microsoft.com/office/drawing/2014/main" id="{606F93B8-7F9F-44CD-B951-02621D03DE55}"/>
+                </a:ext>
+              </a:extLst>
+            </p:cNvPr>
+            <p:cNvSpPr txBox="1"/>
+            <p:nvPr/>
+          </p:nvSpPr>
+          <p:spPr>
+            <a:xfrm>
+              <a:off x="3378875" y="4996451"/>
+              <a:ext cx="797838" cy="184666"/>
+            </a:xfrm>
+            <a:prstGeom prst="rect">
+              <a:avLst/>
+            </a:prstGeom>
+            <a:noFill/>
+          </p:spPr>
+          <p:txBody>
+            <a:bodyPr wrap="square" rtlCol="0">
+              <a:spAutoFit/>
+            </a:bodyPr>
+            <a:lstStyle/>
+            <a:p>
+              <a:r>
+                <a:rPr lang="de-DE" sz="600" dirty="0"/>
+                <a:t>Delta_t10 == True</a:t>
+              </a:r>
+            </a:p>
+          </p:txBody>
+        </p:sp>
+        <p:cxnSp>
+          <p:nvCxnSpPr>
+            <p:cNvPr id="17" name="Verbinder: gewinkelt 16">
+              <a:extLst>
+                <a:ext uri="{FF2B5EF4-FFF2-40B4-BE49-F238E27FC236}">
+                  <a16:creationId xmlns:a16="http://schemas.microsoft.com/office/drawing/2014/main" id="{EEF2256D-9B2F-457A-9884-A3E432ECB74E}"/>
+                </a:ext>
+              </a:extLst>
+            </p:cNvPr>
+            <p:cNvCxnSpPr>
+              <a:cxnSpLocks/>
+              <a:stCxn id="11" idx="2"/>
+              <a:endCxn id="5" idx="2"/>
+            </p:cNvCxnSpPr>
+            <p:nvPr/>
+          </p:nvCxnSpPr>
+          <p:spPr>
+            <a:xfrm rot="10800000" flipH="1">
+              <a:off x="2604834" y="1461437"/>
+              <a:ext cx="1" cy="4041025"/>
+            </a:xfrm>
+            <a:prstGeom prst="bentConnector3">
+              <a:avLst>
+                <a:gd name="adj1" fmla="val -22860000000"/>
+              </a:avLst>
+            </a:prstGeom>
+            <a:ln>
+              <a:solidFill>
+                <a:schemeClr val="tx1"/>
+              </a:solidFill>
+              <a:tailEnd type="triangle"/>
+            </a:ln>
+          </p:spPr>
+          <p:style>
+            <a:lnRef idx="1">
+              <a:schemeClr val="accent1"/>
+            </a:lnRef>
+            <a:fillRef idx="0">
+              <a:schemeClr val="accent1"/>
+            </a:fillRef>
+            <a:effectRef idx="0">
+              <a:schemeClr val="accent1"/>
+            </a:effectRef>
+            <a:fontRef idx="minor">
+              <a:schemeClr val="tx1"/>
+            </a:fontRef>
+          </p:style>
+        </p:cxnSp>
+        <p:sp>
+          <p:nvSpPr>
+            <p:cNvPr id="18" name="Ellipse 17">
+              <a:extLst>
+                <a:ext uri="{FF2B5EF4-FFF2-40B4-BE49-F238E27FC236}">
+                  <a16:creationId xmlns:a16="http://schemas.microsoft.com/office/drawing/2014/main" id="{5C58D7B5-2B2E-46EA-80EC-236697D69E74}"/>
+                </a:ext>
+              </a:extLst>
+            </p:cNvPr>
+            <p:cNvSpPr/>
+            <p:nvPr/>
+          </p:nvSpPr>
+          <p:spPr>
+            <a:xfrm>
+              <a:off x="2604832" y="2275431"/>
+              <a:ext cx="1648327" cy="433137"/>
+            </a:xfrm>
+            <a:prstGeom prst="ellipse">
+              <a:avLst/>
+            </a:prstGeom>
+            <a:solidFill>
+              <a:schemeClr val="accent6">
+                <a:lumMod val="40000"/>
+                <a:lumOff val="60000"/>
+              </a:schemeClr>
+            </a:solidFill>
+            <a:ln w="6350">
+              <a:solidFill>
+                <a:schemeClr val="tx1"/>
+              </a:solidFill>
+            </a:ln>
+          </p:spPr>
+          <p:style>
+            <a:lnRef idx="2">
+              <a:schemeClr val="accent1">
+                <a:shade val="50000"/>
+              </a:schemeClr>
+            </a:lnRef>
+            <a:fillRef idx="1">
+              <a:schemeClr val="accent1"/>
+            </a:fillRef>
+            <a:effectRef idx="0">
+              <a:schemeClr val="accent1"/>
+            </a:effectRef>
+            <a:fontRef idx="minor">
+              <a:schemeClr val="lt1"/>
+            </a:fontRef>
+          </p:style>
+          <p:txBody>
+            <a:bodyPr rtlCol="0" anchor="ctr"/>
+            <a:lstStyle/>
+            <a:p>
+              <a:pPr algn="ctr"/>
+              <a:r>
+                <a:rPr lang="de-DE" sz="800" dirty="0" err="1">
+                  <a:solidFill>
+                    <a:schemeClr val="tx1"/>
+                  </a:solidFill>
+                </a:rPr>
+                <a:t>Kapazität_freischalten</a:t>
+              </a:r>
+              <a:endParaRPr lang="de-DE" sz="800" dirty="0">
+                <a:solidFill>
+                  <a:schemeClr val="tx1"/>
+                </a:solidFill>
+              </a:endParaRPr>
+            </a:p>
+          </p:txBody>
+        </p:sp>
+        <p:cxnSp>
+          <p:nvCxnSpPr>
+            <p:cNvPr id="19" name="Gerade Verbindung mit Pfeil 18">
+              <a:extLst>
+                <a:ext uri="{FF2B5EF4-FFF2-40B4-BE49-F238E27FC236}">
+                  <a16:creationId xmlns:a16="http://schemas.microsoft.com/office/drawing/2014/main" id="{D9ECE6B7-81BD-4764-A742-EDA004568F2F}"/>
+                </a:ext>
+              </a:extLst>
+            </p:cNvPr>
+            <p:cNvCxnSpPr>
+              <a:cxnSpLocks/>
+              <a:stCxn id="18" idx="4"/>
+              <a:endCxn id="6" idx="0"/>
+            </p:cNvCxnSpPr>
+            <p:nvPr/>
+          </p:nvCxnSpPr>
+          <p:spPr>
+            <a:xfrm>
+              <a:off x="3428996" y="2708568"/>
+              <a:ext cx="3" cy="531794"/>
+            </a:xfrm>
+            <a:prstGeom prst="straightConnector1">
+              <a:avLst/>
+            </a:prstGeom>
+            <a:ln>
+              <a:solidFill>
+                <a:schemeClr val="tx1"/>
+              </a:solidFill>
+              <a:tailEnd type="triangle"/>
+            </a:ln>
+          </p:spPr>
+          <p:style>
+            <a:lnRef idx="1">
+              <a:schemeClr val="accent1"/>
+            </a:lnRef>
+            <a:fillRef idx="0">
+              <a:schemeClr val="accent1"/>
+            </a:fillRef>
+            <a:effectRef idx="0">
+              <a:schemeClr val="accent1"/>
+            </a:effectRef>
+            <a:fontRef idx="minor">
+              <a:schemeClr val="tx1"/>
+            </a:fontRef>
+          </p:style>
+        </p:cxnSp>
+        <p:sp>
+          <p:nvSpPr>
+            <p:cNvPr id="20" name="Textfeld 19">
+              <a:extLst>
+                <a:ext uri="{FF2B5EF4-FFF2-40B4-BE49-F238E27FC236}">
+                  <a16:creationId xmlns:a16="http://schemas.microsoft.com/office/drawing/2014/main" id="{2561A1E4-5A17-4026-9918-E62767FFE969}"/>
+                </a:ext>
+              </a:extLst>
+            </p:cNvPr>
+            <p:cNvSpPr txBox="1"/>
+            <p:nvPr/>
+          </p:nvSpPr>
+          <p:spPr>
+            <a:xfrm>
+              <a:off x="3378875" y="2844267"/>
+              <a:ext cx="759720" cy="184666"/>
+            </a:xfrm>
+            <a:prstGeom prst="rect">
+              <a:avLst/>
+            </a:prstGeom>
+            <a:noFill/>
+          </p:spPr>
+          <p:txBody>
+            <a:bodyPr wrap="square" rtlCol="0">
+              <a:spAutoFit/>
+            </a:bodyPr>
+            <a:lstStyle/>
+            <a:p>
+              <a:r>
+                <a:rPr lang="de-DE" sz="600" dirty="0" err="1"/>
+                <a:t>Kapa_frei</a:t>
+              </a:r>
+              <a:r>
+                <a:rPr lang="de-DE" sz="600" dirty="0"/>
+                <a:t> == True</a:t>
+              </a:r>
+            </a:p>
+          </p:txBody>
+        </p:sp>
+      </p:grpSp>
+      <p:sp>
+        <p:nvSpPr>
+          <p:cNvPr id="21" name="Textfeld 20">
+            <a:extLst>
+              <a:ext uri="{FF2B5EF4-FFF2-40B4-BE49-F238E27FC236}">
+                <a16:creationId xmlns:a16="http://schemas.microsoft.com/office/drawing/2014/main" id="{A3598F0C-3217-4F5C-8C42-81F8C45A1302}"/>
+              </a:ext>
+            </a:extLst>
+          </p:cNvPr>
+          <p:cNvSpPr txBox="1"/>
+          <p:nvPr/>
+        </p:nvSpPr>
+        <p:spPr>
+          <a:xfrm>
+            <a:off x="680720" y="248920"/>
+            <a:ext cx="5496518" cy="369332"/>
+          </a:xfrm>
+          <a:prstGeom prst="rect">
+            <a:avLst/>
+          </a:prstGeom>
+          <a:noFill/>
+        </p:spPr>
+        <p:txBody>
+          <a:bodyPr wrap="square" rtlCol="0">
+            <a:spAutoFit/>
+          </a:bodyPr>
+          <a:lstStyle/>
+          <a:p>
+            <a:pPr algn="ctr"/>
+            <a:r>
+              <a:rPr lang="de-DE" dirty="0"/>
+              <a:t>Ablaufdiagramm Java Regelalgorithmus</a:t>
+            </a:r>
+          </a:p>
+        </p:txBody>
+      </p:sp>
+    </p:spTree>
+    <p:extLst>
+      <p:ext uri="{BB962C8B-B14F-4D97-AF65-F5344CB8AC3E}">
+        <p14:creationId xmlns:p14="http://schemas.microsoft.com/office/powerpoint/2010/main" val="1224209538"/>
+      </p:ext>
+    </p:extLst>
+  </p:cSld>
+  <p:clrMapOvr>
+    <a:masterClrMapping/>
+  </p:clrMapOvr>
+</p:sld>
+</file>
+
+<file path=ppt/slides/slide11.xml><?xml version="1.0" encoding="utf-8"?>
+<p:sld xmlns:a="http://schemas.openxmlformats.org/drawingml/2006/main" xmlns:r="http://schemas.openxmlformats.org/officeDocument/2006/relationships" xmlns:p="http://schemas.openxmlformats.org/presentationml/2006/main">
+  <p:cSld>
+    <p:spTree>
+      <p:nvGrpSpPr>
+        <p:cNvPr id="1" name=""/>
+        <p:cNvGrpSpPr/>
+        <p:nvPr/>
+      </p:nvGrpSpPr>
+      <p:grpSpPr>
+        <a:xfrm>
+          <a:off x="0" y="0"/>
+          <a:ext cx="0" cy="0"/>
+          <a:chOff x="0" y="0"/>
+          <a:chExt cx="0" cy="0"/>
+        </a:xfrm>
+      </p:grpSpPr>
       <p:sp>
         <p:nvSpPr>
           <p:cNvPr id="21" name="Textfeld 20">
@@ -7964,7 +8839,7 @@
 </p:sld>
 </file>
 
-<file path=ppt/slides/slide11.xml><?xml version="1.0" encoding="utf-8"?>
+<file path=ppt/slides/slide12.xml><?xml version="1.0" encoding="utf-8"?>
 <p:sld xmlns:a="http://schemas.openxmlformats.org/drawingml/2006/main" xmlns:r="http://schemas.openxmlformats.org/officeDocument/2006/relationships" xmlns:p="http://schemas.openxmlformats.org/presentationml/2006/main">
   <p:cSld>
     <p:spTree>
@@ -9651,7 +10526,7 @@
 </p:sld>
 </file>
 
-<file path=ppt/slides/slide12.xml><?xml version="1.0" encoding="utf-8"?>
+<file path=ppt/slides/slide13.xml><?xml version="1.0" encoding="utf-8"?>
 <p:sld xmlns:a="http://schemas.openxmlformats.org/drawingml/2006/main" xmlns:r="http://schemas.openxmlformats.org/officeDocument/2006/relationships" xmlns:p="http://schemas.openxmlformats.org/presentationml/2006/main">
   <p:cSld>
     <p:spTree>
@@ -11420,7 +12295,7 @@
 </p:sld>
 </file>
 
-<file path=ppt/slides/slide13.xml><?xml version="1.0" encoding="utf-8"?>
+<file path=ppt/slides/slide14.xml><?xml version="1.0" encoding="utf-8"?>
 <p:sld xmlns:a="http://schemas.openxmlformats.org/drawingml/2006/main" xmlns:r="http://schemas.openxmlformats.org/officeDocument/2006/relationships" xmlns:p="http://schemas.openxmlformats.org/presentationml/2006/main">
   <p:cSld>
     <p:spTree>
@@ -14286,7 +15161,7 @@
 </p:sld>
 </file>
 
-<file path=ppt/slides/slide14.xml><?xml version="1.0" encoding="utf-8"?>
+<file path=ppt/slides/slide15.xml><?xml version="1.0" encoding="utf-8"?>
 <p:sld xmlns:a="http://schemas.openxmlformats.org/drawingml/2006/main" xmlns:r="http://schemas.openxmlformats.org/officeDocument/2006/relationships" xmlns:p="http://schemas.openxmlformats.org/presentationml/2006/main">
   <p:cSld>
     <p:spTree>
@@ -19829,6 +20704,1152 @@
 </file>
 
 <file path=ppt/slides/slide2.xml><?xml version="1.0" encoding="utf-8"?>
+<p:sld xmlns:a="http://schemas.openxmlformats.org/drawingml/2006/main" xmlns:r="http://schemas.openxmlformats.org/officeDocument/2006/relationships" xmlns:p="http://schemas.openxmlformats.org/presentationml/2006/main">
+  <p:cSld>
+    <p:spTree>
+      <p:nvGrpSpPr>
+        <p:cNvPr id="1" name=""/>
+        <p:cNvGrpSpPr/>
+        <p:nvPr/>
+      </p:nvGrpSpPr>
+      <p:grpSpPr>
+        <a:xfrm>
+          <a:off x="0" y="0"/>
+          <a:ext cx="0" cy="0"/>
+          <a:chOff x="0" y="0"/>
+          <a:chExt cx="0" cy="0"/>
+        </a:xfrm>
+      </p:grpSpPr>
+      <p:sp>
+        <p:nvSpPr>
+          <p:cNvPr id="4" name="Rechteck 3"/>
+          <p:cNvSpPr/>
+          <p:nvPr/>
+        </p:nvSpPr>
+        <p:spPr>
+          <a:xfrm>
+            <a:off x="994307" y="772215"/>
+            <a:ext cx="5040000" cy="6146745"/>
+          </a:xfrm>
+          <a:prstGeom prst="rect">
+            <a:avLst/>
+          </a:prstGeom>
+          <a:noFill/>
+          <a:ln>
+            <a:solidFill>
+              <a:schemeClr val="tx1"/>
+            </a:solidFill>
+          </a:ln>
+        </p:spPr>
+        <p:style>
+          <a:lnRef idx="2">
+            <a:schemeClr val="accent1">
+              <a:shade val="50000"/>
+            </a:schemeClr>
+          </a:lnRef>
+          <a:fillRef idx="1">
+            <a:schemeClr val="accent1"/>
+          </a:fillRef>
+          <a:effectRef idx="0">
+            <a:schemeClr val="accent1"/>
+          </a:effectRef>
+          <a:fontRef idx="minor">
+            <a:schemeClr val="lt1"/>
+          </a:fontRef>
+        </p:style>
+        <p:txBody>
+          <a:bodyPr rtlCol="0" anchor="ctr"/>
+          <a:lstStyle/>
+          <a:p>
+            <a:pPr algn="ctr"/>
+            <a:endParaRPr lang="de-DE"/>
+          </a:p>
+        </p:txBody>
+      </p:sp>
+      <p:sp>
+        <p:nvSpPr>
+          <p:cNvPr id="8" name="Rechteck 7"/>
+          <p:cNvSpPr/>
+          <p:nvPr/>
+        </p:nvSpPr>
+        <p:spPr>
+          <a:xfrm>
+            <a:off x="2485456" y="870433"/>
+            <a:ext cx="1987297" cy="560832"/>
+          </a:xfrm>
+          <a:prstGeom prst="rect">
+            <a:avLst/>
+          </a:prstGeom>
+          <a:solidFill>
+            <a:srgbClr val="F49000">
+              <a:alpha val="50196"/>
+            </a:srgbClr>
+          </a:solidFill>
+          <a:ln>
+            <a:solidFill>
+              <a:schemeClr val="tx1"/>
+            </a:solidFill>
+          </a:ln>
+        </p:spPr>
+        <p:style>
+          <a:lnRef idx="2">
+            <a:schemeClr val="accent1">
+              <a:shade val="50000"/>
+            </a:schemeClr>
+          </a:lnRef>
+          <a:fillRef idx="1">
+            <a:schemeClr val="accent1"/>
+          </a:fillRef>
+          <a:effectRef idx="0">
+            <a:schemeClr val="accent1"/>
+          </a:effectRef>
+          <a:fontRef idx="minor">
+            <a:schemeClr val="lt1"/>
+          </a:fontRef>
+        </p:style>
+        <p:txBody>
+          <a:bodyPr rtlCol="0" anchor="ctr"/>
+          <a:lstStyle/>
+          <a:p>
+            <a:pPr algn="ctr"/>
+            <a:r>
+              <a:rPr lang="de-DE" sz="1200" dirty="0" smtClean="0">
+                <a:solidFill>
+                  <a:schemeClr val="tx1"/>
+                </a:solidFill>
+                <a:latin typeface="Arial" panose="020B0604020202020204" pitchFamily="34" charset="0"/>
+                <a:cs typeface="Arial" panose="020B0604020202020204" pitchFamily="34" charset="0"/>
+              </a:rPr>
+              <a:t>E-PKW mit unbekanntem Verhalten</a:t>
+            </a:r>
+            <a:endParaRPr lang="de-DE" sz="1200" dirty="0">
+              <a:solidFill>
+                <a:schemeClr val="tx1"/>
+              </a:solidFill>
+              <a:latin typeface="Arial" panose="020B0604020202020204" pitchFamily="34" charset="0"/>
+              <a:cs typeface="Arial" panose="020B0604020202020204" pitchFamily="34" charset="0"/>
+            </a:endParaRPr>
+          </a:p>
+        </p:txBody>
+      </p:sp>
+      <p:sp>
+        <p:nvSpPr>
+          <p:cNvPr id="9" name="Rechteck 8"/>
+          <p:cNvSpPr/>
+          <p:nvPr/>
+        </p:nvSpPr>
+        <p:spPr>
+          <a:xfrm>
+            <a:off x="2485457" y="2075199"/>
+            <a:ext cx="1987297" cy="560832"/>
+          </a:xfrm>
+          <a:prstGeom prst="rect">
+            <a:avLst/>
+          </a:prstGeom>
+          <a:solidFill>
+            <a:srgbClr val="F49000">
+              <a:alpha val="60000"/>
+            </a:srgbClr>
+          </a:solidFill>
+          <a:ln>
+            <a:solidFill>
+              <a:schemeClr val="tx1"/>
+            </a:solidFill>
+          </a:ln>
+        </p:spPr>
+        <p:style>
+          <a:lnRef idx="2">
+            <a:schemeClr val="accent1">
+              <a:shade val="50000"/>
+            </a:schemeClr>
+          </a:lnRef>
+          <a:fillRef idx="1">
+            <a:schemeClr val="accent1"/>
+          </a:fillRef>
+          <a:effectRef idx="0">
+            <a:schemeClr val="accent1"/>
+          </a:effectRef>
+          <a:fontRef idx="minor">
+            <a:schemeClr val="lt1"/>
+          </a:fontRef>
+        </p:style>
+        <p:txBody>
+          <a:bodyPr rtlCol="0" anchor="ctr"/>
+          <a:lstStyle/>
+          <a:p>
+            <a:pPr algn="ctr"/>
+            <a:r>
+              <a:rPr lang="de-DE" sz="1200" dirty="0" smtClean="0">
+                <a:solidFill>
+                  <a:schemeClr val="tx1"/>
+                </a:solidFill>
+                <a:latin typeface="Arial" panose="020B0604020202020204" pitchFamily="34" charset="0"/>
+                <a:cs typeface="Arial" panose="020B0604020202020204" pitchFamily="34" charset="0"/>
+              </a:rPr>
+              <a:t>Pool angeschlossener E-PKW</a:t>
+            </a:r>
+            <a:endParaRPr lang="de-DE" sz="1200" dirty="0">
+              <a:solidFill>
+                <a:schemeClr val="tx1"/>
+              </a:solidFill>
+              <a:latin typeface="Arial" panose="020B0604020202020204" pitchFamily="34" charset="0"/>
+              <a:cs typeface="Arial" panose="020B0604020202020204" pitchFamily="34" charset="0"/>
+            </a:endParaRPr>
+          </a:p>
+        </p:txBody>
+      </p:sp>
+      <p:sp>
+        <p:nvSpPr>
+          <p:cNvPr id="10" name="Rechteck 9"/>
+          <p:cNvSpPr/>
+          <p:nvPr/>
+        </p:nvSpPr>
+        <p:spPr>
+          <a:xfrm>
+            <a:off x="2485460" y="3276001"/>
+            <a:ext cx="1987296" cy="454643"/>
+          </a:xfrm>
+          <a:prstGeom prst="rect">
+            <a:avLst/>
+          </a:prstGeom>
+          <a:solidFill>
+            <a:srgbClr val="F49000">
+              <a:alpha val="69804"/>
+            </a:srgbClr>
+          </a:solidFill>
+          <a:ln>
+            <a:solidFill>
+              <a:schemeClr val="tx1"/>
+            </a:solidFill>
+          </a:ln>
+        </p:spPr>
+        <p:style>
+          <a:lnRef idx="2">
+            <a:schemeClr val="accent1">
+              <a:shade val="50000"/>
+            </a:schemeClr>
+          </a:lnRef>
+          <a:fillRef idx="1">
+            <a:schemeClr val="accent1"/>
+          </a:fillRef>
+          <a:effectRef idx="0">
+            <a:schemeClr val="accent1"/>
+          </a:effectRef>
+          <a:fontRef idx="minor">
+            <a:schemeClr val="lt1"/>
+          </a:fontRef>
+        </p:style>
+        <p:txBody>
+          <a:bodyPr rtlCol="0" anchor="t"/>
+          <a:lstStyle/>
+          <a:p>
+            <a:pPr algn="ctr"/>
+            <a:r>
+              <a:rPr lang="de-DE" sz="1200" dirty="0" smtClean="0">
+                <a:solidFill>
+                  <a:schemeClr val="tx1"/>
+                </a:solidFill>
+                <a:latin typeface="Arial" panose="020B0604020202020204" pitchFamily="34" charset="0"/>
+                <a:cs typeface="Arial" panose="020B0604020202020204" pitchFamily="34" charset="0"/>
+              </a:rPr>
+              <a:t>Kombinations-möglichkeiten</a:t>
+            </a:r>
+            <a:endParaRPr lang="de-DE" sz="1200" dirty="0">
+              <a:solidFill>
+                <a:schemeClr val="tx1"/>
+              </a:solidFill>
+              <a:latin typeface="Arial" panose="020B0604020202020204" pitchFamily="34" charset="0"/>
+              <a:cs typeface="Arial" panose="020B0604020202020204" pitchFamily="34" charset="0"/>
+            </a:endParaRPr>
+          </a:p>
+        </p:txBody>
+      </p:sp>
+      <p:sp>
+        <p:nvSpPr>
+          <p:cNvPr id="13" name="Nach unten gekrümmter Pfeil 12"/>
+          <p:cNvSpPr/>
+          <p:nvPr/>
+        </p:nvSpPr>
+        <p:spPr>
+          <a:xfrm rot="5400000" flipH="1" flipV="1">
+            <a:off x="1673781" y="3639984"/>
+            <a:ext cx="950513" cy="541555"/>
+          </a:xfrm>
+          <a:prstGeom prst="curvedDownArrow">
+            <a:avLst/>
+          </a:prstGeom>
+          <a:solidFill>
+            <a:srgbClr val="00AA96"/>
+          </a:solidFill>
+          <a:ln>
+            <a:solidFill>
+              <a:schemeClr val="tx1"/>
+            </a:solidFill>
+          </a:ln>
+        </p:spPr>
+        <p:style>
+          <a:lnRef idx="2">
+            <a:schemeClr val="accent1">
+              <a:shade val="50000"/>
+            </a:schemeClr>
+          </a:lnRef>
+          <a:fillRef idx="1">
+            <a:schemeClr val="accent1"/>
+          </a:fillRef>
+          <a:effectRef idx="0">
+            <a:schemeClr val="accent1"/>
+          </a:effectRef>
+          <a:fontRef idx="minor">
+            <a:schemeClr val="lt1"/>
+          </a:fontRef>
+        </p:style>
+        <p:txBody>
+          <a:bodyPr rtlCol="0" anchor="ctr"/>
+          <a:lstStyle/>
+          <a:p>
+            <a:pPr algn="ctr"/>
+            <a:endParaRPr lang="de-DE">
+              <a:solidFill>
+                <a:schemeClr val="tx1"/>
+              </a:solidFill>
+            </a:endParaRPr>
+          </a:p>
+        </p:txBody>
+      </p:sp>
+      <p:sp>
+        <p:nvSpPr>
+          <p:cNvPr id="16" name="Rechteck 15"/>
+          <p:cNvSpPr/>
+          <p:nvPr/>
+        </p:nvSpPr>
+        <p:spPr>
+          <a:xfrm>
+            <a:off x="2485458" y="4121895"/>
+            <a:ext cx="1987297" cy="454643"/>
+          </a:xfrm>
+          <a:prstGeom prst="rect">
+            <a:avLst/>
+          </a:prstGeom>
+          <a:solidFill>
+            <a:srgbClr val="F49000">
+              <a:alpha val="80000"/>
+            </a:srgbClr>
+          </a:solidFill>
+          <a:ln>
+            <a:solidFill>
+              <a:schemeClr val="tx1"/>
+            </a:solidFill>
+          </a:ln>
+        </p:spPr>
+        <p:style>
+          <a:lnRef idx="2">
+            <a:schemeClr val="accent1">
+              <a:shade val="50000"/>
+            </a:schemeClr>
+          </a:lnRef>
+          <a:fillRef idx="1">
+            <a:schemeClr val="accent1"/>
+          </a:fillRef>
+          <a:effectRef idx="0">
+            <a:schemeClr val="accent1"/>
+          </a:effectRef>
+          <a:fontRef idx="minor">
+            <a:schemeClr val="lt1"/>
+          </a:fontRef>
+        </p:style>
+        <p:txBody>
+          <a:bodyPr rtlCol="0" anchor="t"/>
+          <a:lstStyle/>
+          <a:p>
+            <a:pPr algn="ctr"/>
+            <a:r>
+              <a:rPr lang="de-DE" sz="1200" dirty="0" smtClean="0">
+                <a:solidFill>
+                  <a:schemeClr val="tx1"/>
+                </a:solidFill>
+                <a:latin typeface="Arial" panose="020B0604020202020204" pitchFamily="34" charset="0"/>
+                <a:cs typeface="Arial" panose="020B0604020202020204" pitchFamily="34" charset="0"/>
+              </a:rPr>
+              <a:t>Score und Grenzwerteinhaltung </a:t>
+            </a:r>
+            <a:endParaRPr lang="de-DE" sz="1200" dirty="0">
+              <a:solidFill>
+                <a:schemeClr val="tx1"/>
+              </a:solidFill>
+              <a:latin typeface="Arial" panose="020B0604020202020204" pitchFamily="34" charset="0"/>
+              <a:cs typeface="Arial" panose="020B0604020202020204" pitchFamily="34" charset="0"/>
+            </a:endParaRPr>
+          </a:p>
+        </p:txBody>
+      </p:sp>
+      <p:sp>
+        <p:nvSpPr>
+          <p:cNvPr id="17" name="Textfeld 16"/>
+          <p:cNvSpPr txBox="1"/>
+          <p:nvPr/>
+        </p:nvSpPr>
+        <p:spPr>
+          <a:xfrm>
+            <a:off x="2419815" y="1524474"/>
+            <a:ext cx="1969008" cy="461665"/>
+          </a:xfrm>
+          <a:prstGeom prst="rect">
+            <a:avLst/>
+          </a:prstGeom>
+          <a:noFill/>
+        </p:spPr>
+        <p:txBody>
+          <a:bodyPr wrap="square" rtlCol="0">
+            <a:spAutoFit/>
+          </a:bodyPr>
+          <a:lstStyle/>
+          <a:p>
+            <a:r>
+              <a:rPr lang="de-DE" sz="1200" dirty="0" smtClean="0">
+                <a:latin typeface="Arial" panose="020B0604020202020204" pitchFamily="34" charset="0"/>
+                <a:cs typeface="Arial" panose="020B0604020202020204" pitchFamily="34" charset="0"/>
+              </a:rPr>
+              <a:t>Fahrzeug </a:t>
+            </a:r>
+          </a:p>
+          <a:p>
+            <a:r>
+              <a:rPr lang="de-DE" sz="1200" dirty="0" smtClean="0">
+                <a:latin typeface="Arial" panose="020B0604020202020204" pitchFamily="34" charset="0"/>
+                <a:cs typeface="Arial" panose="020B0604020202020204" pitchFamily="34" charset="0"/>
+              </a:rPr>
+              <a:t>prüfen</a:t>
+            </a:r>
+            <a:endParaRPr lang="de-DE" sz="1200" dirty="0">
+              <a:latin typeface="Arial" panose="020B0604020202020204" pitchFamily="34" charset="0"/>
+              <a:cs typeface="Arial" panose="020B0604020202020204" pitchFamily="34" charset="0"/>
+            </a:endParaRPr>
+          </a:p>
+        </p:txBody>
+      </p:sp>
+      <p:sp>
+        <p:nvSpPr>
+          <p:cNvPr id="18" name="Textfeld 17"/>
+          <p:cNvSpPr txBox="1"/>
+          <p:nvPr/>
+        </p:nvSpPr>
+        <p:spPr>
+          <a:xfrm>
+            <a:off x="2353871" y="2736558"/>
+            <a:ext cx="1604290" cy="461665"/>
+          </a:xfrm>
+          <a:prstGeom prst="rect">
+            <a:avLst/>
+          </a:prstGeom>
+          <a:noFill/>
+        </p:spPr>
+        <p:txBody>
+          <a:bodyPr wrap="square" rtlCol="0">
+            <a:spAutoFit/>
+          </a:bodyPr>
+          <a:lstStyle/>
+          <a:p>
+            <a:r>
+              <a:rPr lang="de-DE" sz="1200" dirty="0" smtClean="0">
+                <a:latin typeface="Arial" panose="020B0604020202020204" pitchFamily="34" charset="0"/>
+                <a:cs typeface="Arial" panose="020B0604020202020204" pitchFamily="34" charset="0"/>
+              </a:rPr>
+              <a:t>Optimierer</a:t>
+            </a:r>
+            <a:r>
+              <a:rPr lang="de-DE" sz="900" dirty="0">
+                <a:latin typeface="Arial" panose="020B0604020202020204" pitchFamily="34" charset="0"/>
+                <a:cs typeface="Arial" panose="020B0604020202020204" pitchFamily="34" charset="0"/>
+              </a:rPr>
+              <a:t> </a:t>
+            </a:r>
+            <a:endParaRPr lang="de-DE" sz="900" dirty="0" smtClean="0">
+              <a:latin typeface="Arial" panose="020B0604020202020204" pitchFamily="34" charset="0"/>
+              <a:cs typeface="Arial" panose="020B0604020202020204" pitchFamily="34" charset="0"/>
+            </a:endParaRPr>
+          </a:p>
+          <a:p>
+            <a:r>
+              <a:rPr lang="de-DE" sz="1200" dirty="0" smtClean="0">
+                <a:latin typeface="Arial" panose="020B0604020202020204" pitchFamily="34" charset="0"/>
+                <a:cs typeface="Arial" panose="020B0604020202020204" pitchFamily="34" charset="0"/>
+              </a:rPr>
+              <a:t>ausführen</a:t>
+            </a:r>
+            <a:endParaRPr lang="de-DE" sz="1200" dirty="0">
+              <a:latin typeface="Arial" panose="020B0604020202020204" pitchFamily="34" charset="0"/>
+              <a:cs typeface="Arial" panose="020B0604020202020204" pitchFamily="34" charset="0"/>
+            </a:endParaRPr>
+          </a:p>
+        </p:txBody>
+      </p:sp>
+      <p:sp>
+        <p:nvSpPr>
+          <p:cNvPr id="19" name="Pfeil nach rechts 18"/>
+          <p:cNvSpPr/>
+          <p:nvPr/>
+        </p:nvSpPr>
+        <p:spPr>
+          <a:xfrm rot="5400000">
+            <a:off x="3233198" y="4630895"/>
+            <a:ext cx="491818" cy="518160"/>
+          </a:xfrm>
+          <a:prstGeom prst="rightArrow">
+            <a:avLst/>
+          </a:prstGeom>
+          <a:solidFill>
+            <a:srgbClr val="00AA96"/>
+          </a:solidFill>
+          <a:ln>
+            <a:solidFill>
+              <a:schemeClr val="tx1"/>
+            </a:solidFill>
+          </a:ln>
+        </p:spPr>
+        <p:style>
+          <a:lnRef idx="2">
+            <a:schemeClr val="accent1">
+              <a:shade val="50000"/>
+            </a:schemeClr>
+          </a:lnRef>
+          <a:fillRef idx="1">
+            <a:schemeClr val="accent1"/>
+          </a:fillRef>
+          <a:effectRef idx="0">
+            <a:schemeClr val="accent1"/>
+          </a:effectRef>
+          <a:fontRef idx="minor">
+            <a:schemeClr val="lt1"/>
+          </a:fontRef>
+        </p:style>
+        <p:txBody>
+          <a:bodyPr rtlCol="0" anchor="ctr"/>
+          <a:lstStyle/>
+          <a:p>
+            <a:pPr algn="ctr"/>
+            <a:endParaRPr lang="de-DE" sz="1200" dirty="0">
+              <a:latin typeface="Arial" panose="020B0604020202020204" pitchFamily="34" charset="0"/>
+              <a:cs typeface="Arial" panose="020B0604020202020204" pitchFamily="34" charset="0"/>
+            </a:endParaRPr>
+          </a:p>
+        </p:txBody>
+      </p:sp>
+      <p:sp>
+        <p:nvSpPr>
+          <p:cNvPr id="20" name="Nach unten gekrümmter Pfeil 19"/>
+          <p:cNvSpPr/>
+          <p:nvPr/>
+        </p:nvSpPr>
+        <p:spPr>
+          <a:xfrm rot="16200000" flipH="1" flipV="1">
+            <a:off x="4333919" y="3670749"/>
+            <a:ext cx="950513" cy="541555"/>
+          </a:xfrm>
+          <a:prstGeom prst="curvedDownArrow">
+            <a:avLst/>
+          </a:prstGeom>
+          <a:solidFill>
+            <a:srgbClr val="00AA96"/>
+          </a:solidFill>
+          <a:ln>
+            <a:solidFill>
+              <a:schemeClr val="tx1"/>
+            </a:solidFill>
+          </a:ln>
+        </p:spPr>
+        <p:style>
+          <a:lnRef idx="2">
+            <a:schemeClr val="accent1">
+              <a:shade val="50000"/>
+            </a:schemeClr>
+          </a:lnRef>
+          <a:fillRef idx="1">
+            <a:schemeClr val="accent1"/>
+          </a:fillRef>
+          <a:effectRef idx="0">
+            <a:schemeClr val="accent1"/>
+          </a:effectRef>
+          <a:fontRef idx="minor">
+            <a:schemeClr val="lt1"/>
+          </a:fontRef>
+        </p:style>
+        <p:txBody>
+          <a:bodyPr rtlCol="0" anchor="ctr"/>
+          <a:lstStyle/>
+          <a:p>
+            <a:pPr algn="ctr"/>
+            <a:endParaRPr lang="de-DE">
+              <a:solidFill>
+                <a:schemeClr val="tx1"/>
+              </a:solidFill>
+            </a:endParaRPr>
+          </a:p>
+        </p:txBody>
+      </p:sp>
+      <p:sp>
+        <p:nvSpPr>
+          <p:cNvPr id="21" name="Rechteck 20"/>
+          <p:cNvSpPr/>
+          <p:nvPr/>
+        </p:nvSpPr>
+        <p:spPr>
+          <a:xfrm>
+            <a:off x="2485458" y="5197543"/>
+            <a:ext cx="1987297" cy="642130"/>
+          </a:xfrm>
+          <a:prstGeom prst="rect">
+            <a:avLst/>
+          </a:prstGeom>
+          <a:solidFill>
+            <a:srgbClr val="F49000">
+              <a:alpha val="89804"/>
+            </a:srgbClr>
+          </a:solidFill>
+          <a:ln>
+            <a:solidFill>
+              <a:schemeClr val="tx1"/>
+            </a:solidFill>
+          </a:ln>
+        </p:spPr>
+        <p:style>
+          <a:lnRef idx="2">
+            <a:schemeClr val="accent1">
+              <a:shade val="50000"/>
+            </a:schemeClr>
+          </a:lnRef>
+          <a:fillRef idx="1">
+            <a:schemeClr val="accent1"/>
+          </a:fillRef>
+          <a:effectRef idx="0">
+            <a:schemeClr val="accent1"/>
+          </a:effectRef>
+          <a:fontRef idx="minor">
+            <a:schemeClr val="lt1"/>
+          </a:fontRef>
+        </p:style>
+        <p:txBody>
+          <a:bodyPr rtlCol="0" anchor="t"/>
+          <a:lstStyle/>
+          <a:p>
+            <a:pPr algn="ctr"/>
+            <a:r>
+              <a:rPr lang="de-DE" sz="1200" dirty="0" smtClean="0">
+                <a:solidFill>
+                  <a:schemeClr val="tx1"/>
+                </a:solidFill>
+                <a:latin typeface="Arial" panose="020B0604020202020204" pitchFamily="34" charset="0"/>
+                <a:cs typeface="Arial" panose="020B0604020202020204" pitchFamily="34" charset="0"/>
+              </a:rPr>
+              <a:t>Stellströme die Grenz-werte einhalten und dem besten Score besitzen</a:t>
+            </a:r>
+            <a:endParaRPr lang="de-DE" sz="1200" dirty="0">
+              <a:solidFill>
+                <a:schemeClr val="tx1"/>
+              </a:solidFill>
+              <a:latin typeface="Arial" panose="020B0604020202020204" pitchFamily="34" charset="0"/>
+              <a:cs typeface="Arial" panose="020B0604020202020204" pitchFamily="34" charset="0"/>
+            </a:endParaRPr>
+          </a:p>
+        </p:txBody>
+      </p:sp>
+      <p:sp>
+        <p:nvSpPr>
+          <p:cNvPr id="22" name="Rechteck 21"/>
+          <p:cNvSpPr/>
+          <p:nvPr/>
+        </p:nvSpPr>
+        <p:spPr>
+          <a:xfrm>
+            <a:off x="2485458" y="6472133"/>
+            <a:ext cx="1987297" cy="286001"/>
+          </a:xfrm>
+          <a:prstGeom prst="rect">
+            <a:avLst/>
+          </a:prstGeom>
+          <a:solidFill>
+            <a:srgbClr val="F49000"/>
+          </a:solidFill>
+          <a:ln>
+            <a:solidFill>
+              <a:schemeClr val="tx1"/>
+            </a:solidFill>
+          </a:ln>
+        </p:spPr>
+        <p:style>
+          <a:lnRef idx="2">
+            <a:schemeClr val="accent1">
+              <a:shade val="50000"/>
+            </a:schemeClr>
+          </a:lnRef>
+          <a:fillRef idx="1">
+            <a:schemeClr val="accent1"/>
+          </a:fillRef>
+          <a:effectRef idx="0">
+            <a:schemeClr val="accent1"/>
+          </a:effectRef>
+          <a:fontRef idx="minor">
+            <a:schemeClr val="lt1"/>
+          </a:fontRef>
+        </p:style>
+        <p:txBody>
+          <a:bodyPr rtlCol="0" anchor="t"/>
+          <a:lstStyle/>
+          <a:p>
+            <a:pPr algn="ctr"/>
+            <a:r>
+              <a:rPr lang="de-DE" sz="1200" dirty="0" smtClean="0">
+                <a:solidFill>
+                  <a:schemeClr val="tx1"/>
+                </a:solidFill>
+                <a:latin typeface="Arial" panose="020B0604020202020204" pitchFamily="34" charset="0"/>
+                <a:cs typeface="Arial" panose="020B0604020202020204" pitchFamily="34" charset="0"/>
+              </a:rPr>
+              <a:t>Optimierter Betrieb</a:t>
+            </a:r>
+            <a:endParaRPr lang="de-DE" sz="1200" dirty="0">
+              <a:solidFill>
+                <a:schemeClr val="tx1"/>
+              </a:solidFill>
+              <a:latin typeface="Arial" panose="020B0604020202020204" pitchFamily="34" charset="0"/>
+              <a:cs typeface="Arial" panose="020B0604020202020204" pitchFamily="34" charset="0"/>
+            </a:endParaRPr>
+          </a:p>
+        </p:txBody>
+      </p:sp>
+      <p:sp>
+        <p:nvSpPr>
+          <p:cNvPr id="24" name="Pfeil nach rechts 23"/>
+          <p:cNvSpPr/>
+          <p:nvPr/>
+        </p:nvSpPr>
+        <p:spPr>
+          <a:xfrm rot="5400000">
+            <a:off x="3233198" y="5896823"/>
+            <a:ext cx="491818" cy="518160"/>
+          </a:xfrm>
+          <a:prstGeom prst="rightArrow">
+            <a:avLst/>
+          </a:prstGeom>
+          <a:solidFill>
+            <a:srgbClr val="00AA96"/>
+          </a:solidFill>
+          <a:ln>
+            <a:solidFill>
+              <a:schemeClr val="tx1"/>
+            </a:solidFill>
+          </a:ln>
+        </p:spPr>
+        <p:style>
+          <a:lnRef idx="2">
+            <a:schemeClr val="accent1">
+              <a:shade val="50000"/>
+            </a:schemeClr>
+          </a:lnRef>
+          <a:fillRef idx="1">
+            <a:schemeClr val="accent1"/>
+          </a:fillRef>
+          <a:effectRef idx="0">
+            <a:schemeClr val="accent1"/>
+          </a:effectRef>
+          <a:fontRef idx="minor">
+            <a:schemeClr val="lt1"/>
+          </a:fontRef>
+        </p:style>
+        <p:txBody>
+          <a:bodyPr rtlCol="0" anchor="ctr"/>
+          <a:lstStyle/>
+          <a:p>
+            <a:pPr algn="ctr"/>
+            <a:endParaRPr lang="de-DE" sz="1200" dirty="0">
+              <a:latin typeface="Arial" panose="020B0604020202020204" pitchFamily="34" charset="0"/>
+              <a:cs typeface="Arial" panose="020B0604020202020204" pitchFamily="34" charset="0"/>
+            </a:endParaRPr>
+          </a:p>
+        </p:txBody>
+      </p:sp>
+      <p:sp>
+        <p:nvSpPr>
+          <p:cNvPr id="25" name="Pfeil nach rechts 24"/>
+          <p:cNvSpPr/>
+          <p:nvPr/>
+        </p:nvSpPr>
+        <p:spPr>
+          <a:xfrm rot="5400000">
+            <a:off x="3232342" y="2708311"/>
+            <a:ext cx="491818" cy="518160"/>
+          </a:xfrm>
+          <a:prstGeom prst="rightArrow">
+            <a:avLst/>
+          </a:prstGeom>
+          <a:solidFill>
+            <a:srgbClr val="00AA96"/>
+          </a:solidFill>
+          <a:ln>
+            <a:solidFill>
+              <a:schemeClr val="tx1"/>
+            </a:solidFill>
+          </a:ln>
+        </p:spPr>
+        <p:style>
+          <a:lnRef idx="2">
+            <a:schemeClr val="accent1">
+              <a:shade val="50000"/>
+            </a:schemeClr>
+          </a:lnRef>
+          <a:fillRef idx="1">
+            <a:schemeClr val="accent1"/>
+          </a:fillRef>
+          <a:effectRef idx="0">
+            <a:schemeClr val="accent1"/>
+          </a:effectRef>
+          <a:fontRef idx="minor">
+            <a:schemeClr val="lt1"/>
+          </a:fontRef>
+        </p:style>
+        <p:txBody>
+          <a:bodyPr rtlCol="0" anchor="ctr"/>
+          <a:lstStyle/>
+          <a:p>
+            <a:pPr algn="ctr"/>
+            <a:endParaRPr lang="de-DE" sz="1200" dirty="0">
+              <a:latin typeface="Arial" panose="020B0604020202020204" pitchFamily="34" charset="0"/>
+              <a:cs typeface="Arial" panose="020B0604020202020204" pitchFamily="34" charset="0"/>
+            </a:endParaRPr>
+          </a:p>
+        </p:txBody>
+      </p:sp>
+      <p:sp>
+        <p:nvSpPr>
+          <p:cNvPr id="26" name="Pfeil nach rechts 25"/>
+          <p:cNvSpPr/>
+          <p:nvPr/>
+        </p:nvSpPr>
+        <p:spPr>
+          <a:xfrm rot="5400000">
+            <a:off x="3232342" y="1492449"/>
+            <a:ext cx="491818" cy="518160"/>
+          </a:xfrm>
+          <a:prstGeom prst="rightArrow">
+            <a:avLst/>
+          </a:prstGeom>
+          <a:solidFill>
+            <a:srgbClr val="00AA96"/>
+          </a:solidFill>
+          <a:ln>
+            <a:solidFill>
+              <a:schemeClr val="tx1"/>
+            </a:solidFill>
+          </a:ln>
+        </p:spPr>
+        <p:style>
+          <a:lnRef idx="2">
+            <a:schemeClr val="accent1">
+              <a:shade val="50000"/>
+            </a:schemeClr>
+          </a:lnRef>
+          <a:fillRef idx="1">
+            <a:schemeClr val="accent1"/>
+          </a:fillRef>
+          <a:effectRef idx="0">
+            <a:schemeClr val="accent1"/>
+          </a:effectRef>
+          <a:fontRef idx="minor">
+            <a:schemeClr val="lt1"/>
+          </a:fontRef>
+        </p:style>
+        <p:txBody>
+          <a:bodyPr rtlCol="0" anchor="ctr"/>
+          <a:lstStyle/>
+          <a:p>
+            <a:pPr algn="ctr"/>
+            <a:endParaRPr lang="de-DE" sz="1200" dirty="0">
+              <a:latin typeface="Arial" panose="020B0604020202020204" pitchFamily="34" charset="0"/>
+              <a:cs typeface="Arial" panose="020B0604020202020204" pitchFamily="34" charset="0"/>
+            </a:endParaRPr>
+          </a:p>
+        </p:txBody>
+      </p:sp>
+      <p:sp>
+        <p:nvSpPr>
+          <p:cNvPr id="27" name="Textfeld 26"/>
+          <p:cNvSpPr txBox="1"/>
+          <p:nvPr/>
+        </p:nvSpPr>
+        <p:spPr>
+          <a:xfrm>
+            <a:off x="2353871" y="4639723"/>
+            <a:ext cx="1604290" cy="461665"/>
+          </a:xfrm>
+          <a:prstGeom prst="rect">
+            <a:avLst/>
+          </a:prstGeom>
+          <a:noFill/>
+        </p:spPr>
+        <p:txBody>
+          <a:bodyPr wrap="square" rtlCol="0">
+            <a:spAutoFit/>
+          </a:bodyPr>
+          <a:lstStyle/>
+          <a:p>
+            <a:r>
+              <a:rPr lang="de-DE" sz="1200" dirty="0" smtClean="0">
+                <a:latin typeface="Arial" panose="020B0604020202020204" pitchFamily="34" charset="0"/>
+                <a:cs typeface="Arial" panose="020B0604020202020204" pitchFamily="34" charset="0"/>
+              </a:rPr>
+              <a:t>Auswahl</a:t>
+            </a:r>
+          </a:p>
+          <a:p>
+            <a:r>
+              <a:rPr lang="de-DE" sz="1200" dirty="0" smtClean="0">
+                <a:latin typeface="Arial" panose="020B0604020202020204" pitchFamily="34" charset="0"/>
+                <a:cs typeface="Arial" panose="020B0604020202020204" pitchFamily="34" charset="0"/>
+              </a:rPr>
+              <a:t>treffen</a:t>
+            </a:r>
+            <a:endParaRPr lang="de-DE" sz="1200" dirty="0">
+              <a:latin typeface="Arial" panose="020B0604020202020204" pitchFamily="34" charset="0"/>
+              <a:cs typeface="Arial" panose="020B0604020202020204" pitchFamily="34" charset="0"/>
+            </a:endParaRPr>
+          </a:p>
+        </p:txBody>
+      </p:sp>
+      <p:sp>
+        <p:nvSpPr>
+          <p:cNvPr id="28" name="Textfeld 27"/>
+          <p:cNvSpPr txBox="1"/>
+          <p:nvPr/>
+        </p:nvSpPr>
+        <p:spPr>
+          <a:xfrm>
+            <a:off x="2353871" y="5909593"/>
+            <a:ext cx="1604290" cy="461665"/>
+          </a:xfrm>
+          <a:prstGeom prst="rect">
+            <a:avLst/>
+          </a:prstGeom>
+          <a:noFill/>
+        </p:spPr>
+        <p:txBody>
+          <a:bodyPr wrap="square" rtlCol="0">
+            <a:spAutoFit/>
+          </a:bodyPr>
+          <a:lstStyle/>
+          <a:p>
+            <a:r>
+              <a:rPr lang="de-DE" sz="1200" dirty="0" smtClean="0">
+                <a:latin typeface="Arial" panose="020B0604020202020204" pitchFamily="34" charset="0"/>
+                <a:cs typeface="Arial" panose="020B0604020202020204" pitchFamily="34" charset="0"/>
+              </a:rPr>
+              <a:t>Ergebnis</a:t>
+            </a:r>
+          </a:p>
+          <a:p>
+            <a:r>
+              <a:rPr lang="de-DE" sz="1200" dirty="0" smtClean="0">
+                <a:latin typeface="Arial" panose="020B0604020202020204" pitchFamily="34" charset="0"/>
+                <a:cs typeface="Arial" panose="020B0604020202020204" pitchFamily="34" charset="0"/>
+              </a:rPr>
+              <a:t>umsetzen</a:t>
+            </a:r>
+            <a:endParaRPr lang="de-DE" sz="1200" dirty="0">
+              <a:latin typeface="Arial" panose="020B0604020202020204" pitchFamily="34" charset="0"/>
+              <a:cs typeface="Arial" panose="020B0604020202020204" pitchFamily="34" charset="0"/>
+            </a:endParaRPr>
+          </a:p>
+        </p:txBody>
+      </p:sp>
+      <p:sp>
+        <p:nvSpPr>
+          <p:cNvPr id="30" name="Nach unten gekrümmter Pfeil 29"/>
+          <p:cNvSpPr/>
+          <p:nvPr/>
+        </p:nvSpPr>
+        <p:spPr>
+          <a:xfrm rot="5400000" flipH="1" flipV="1">
+            <a:off x="-1121380" y="3273919"/>
+            <a:ext cx="5867991" cy="1061018"/>
+          </a:xfrm>
+          <a:prstGeom prst="curvedDownArrow">
+            <a:avLst/>
+          </a:prstGeom>
+          <a:solidFill>
+            <a:srgbClr val="00AA96"/>
+          </a:solidFill>
+          <a:ln>
+            <a:solidFill>
+              <a:schemeClr val="tx1"/>
+            </a:solidFill>
+          </a:ln>
+        </p:spPr>
+        <p:style>
+          <a:lnRef idx="2">
+            <a:schemeClr val="accent1">
+              <a:shade val="50000"/>
+            </a:schemeClr>
+          </a:lnRef>
+          <a:fillRef idx="1">
+            <a:schemeClr val="accent1"/>
+          </a:fillRef>
+          <a:effectRef idx="0">
+            <a:schemeClr val="accent1"/>
+          </a:effectRef>
+          <a:fontRef idx="minor">
+            <a:schemeClr val="lt1"/>
+          </a:fontRef>
+        </p:style>
+        <p:txBody>
+          <a:bodyPr rtlCol="0" anchor="ctr"/>
+          <a:lstStyle/>
+          <a:p>
+            <a:pPr algn="ctr"/>
+            <a:endParaRPr lang="de-DE">
+              <a:solidFill>
+                <a:schemeClr val="tx1"/>
+              </a:solidFill>
+            </a:endParaRPr>
+          </a:p>
+        </p:txBody>
+      </p:sp>
+      <p:sp>
+        <p:nvSpPr>
+          <p:cNvPr id="31" name="Nach unten gekrümmter Pfeil 30"/>
+          <p:cNvSpPr/>
+          <p:nvPr/>
+        </p:nvSpPr>
+        <p:spPr>
+          <a:xfrm rot="16200000" flipV="1">
+            <a:off x="2813982" y="3876302"/>
+            <a:ext cx="4663225" cy="1061018"/>
+          </a:xfrm>
+          <a:prstGeom prst="curvedDownArrow">
+            <a:avLst/>
+          </a:prstGeom>
+          <a:solidFill>
+            <a:srgbClr val="00AA96"/>
+          </a:solidFill>
+          <a:ln>
+            <a:solidFill>
+              <a:schemeClr val="tx1"/>
+            </a:solidFill>
+          </a:ln>
+        </p:spPr>
+        <p:style>
+          <a:lnRef idx="2">
+            <a:schemeClr val="accent1">
+              <a:shade val="50000"/>
+            </a:schemeClr>
+          </a:lnRef>
+          <a:fillRef idx="1">
+            <a:schemeClr val="accent1"/>
+          </a:fillRef>
+          <a:effectRef idx="0">
+            <a:schemeClr val="accent1"/>
+          </a:effectRef>
+          <a:fontRef idx="minor">
+            <a:schemeClr val="lt1"/>
+          </a:fontRef>
+        </p:style>
+        <p:txBody>
+          <a:bodyPr rtlCol="0" anchor="ctr"/>
+          <a:lstStyle/>
+          <a:p>
+            <a:pPr algn="ctr"/>
+            <a:endParaRPr lang="de-DE">
+              <a:solidFill>
+                <a:schemeClr val="tx1"/>
+              </a:solidFill>
+            </a:endParaRPr>
+          </a:p>
+        </p:txBody>
+      </p:sp>
+      <p:sp>
+        <p:nvSpPr>
+          <p:cNvPr id="32" name="Textfeld 31"/>
+          <p:cNvSpPr txBox="1"/>
+          <p:nvPr/>
+        </p:nvSpPr>
+        <p:spPr>
+          <a:xfrm rot="16200000">
+            <a:off x="-1472" y="3610143"/>
+            <a:ext cx="2282666" cy="276999"/>
+          </a:xfrm>
+          <a:prstGeom prst="rect">
+            <a:avLst/>
+          </a:prstGeom>
+          <a:noFill/>
+        </p:spPr>
+        <p:txBody>
+          <a:bodyPr wrap="square" rtlCol="0">
+            <a:spAutoFit/>
+          </a:bodyPr>
+          <a:lstStyle/>
+          <a:p>
+            <a:r>
+              <a:rPr lang="de-DE" sz="1200" dirty="0" smtClean="0">
+                <a:latin typeface="Arial" panose="020B0604020202020204" pitchFamily="34" charset="0"/>
+                <a:cs typeface="Arial" panose="020B0604020202020204" pitchFamily="34" charset="0"/>
+              </a:rPr>
+              <a:t>Neues Fahrzeug kommt hinzu</a:t>
+            </a:r>
+            <a:endParaRPr lang="de-DE" sz="1200" dirty="0">
+              <a:latin typeface="Arial" panose="020B0604020202020204" pitchFamily="34" charset="0"/>
+              <a:cs typeface="Arial" panose="020B0604020202020204" pitchFamily="34" charset="0"/>
+            </a:endParaRPr>
+          </a:p>
+        </p:txBody>
+      </p:sp>
+      <p:sp>
+        <p:nvSpPr>
+          <p:cNvPr id="33" name="Textfeld 32"/>
+          <p:cNvSpPr txBox="1"/>
+          <p:nvPr/>
+        </p:nvSpPr>
+        <p:spPr>
+          <a:xfrm rot="16200000">
+            <a:off x="4393887" y="4175978"/>
+            <a:ext cx="2922637" cy="461665"/>
+          </a:xfrm>
+          <a:prstGeom prst="rect">
+            <a:avLst/>
+          </a:prstGeom>
+          <a:noFill/>
+        </p:spPr>
+        <p:txBody>
+          <a:bodyPr wrap="square" rtlCol="0">
+            <a:spAutoFit/>
+          </a:bodyPr>
+          <a:lstStyle/>
+          <a:p>
+            <a:pPr algn="ctr"/>
+            <a:r>
+              <a:rPr lang="de-DE" sz="1200" dirty="0" smtClean="0">
+                <a:latin typeface="Arial" panose="020B0604020202020204" pitchFamily="34" charset="0"/>
+                <a:cs typeface="Arial" panose="020B0604020202020204" pitchFamily="34" charset="0"/>
+              </a:rPr>
+              <a:t>Fahrzeuge verlassen den Ladezustand oder die Grenzwerte ändern sich</a:t>
+            </a:r>
+            <a:endParaRPr lang="de-DE" sz="1200" dirty="0">
+              <a:latin typeface="Arial" panose="020B0604020202020204" pitchFamily="34" charset="0"/>
+              <a:cs typeface="Arial" panose="020B0604020202020204" pitchFamily="34" charset="0"/>
+            </a:endParaRPr>
+          </a:p>
+        </p:txBody>
+      </p:sp>
+    </p:spTree>
+    <p:extLst>
+      <p:ext uri="{BB962C8B-B14F-4D97-AF65-F5344CB8AC3E}">
+        <p14:creationId xmlns:p14="http://schemas.microsoft.com/office/powerpoint/2010/main" val="361445585"/>
+      </p:ext>
+    </p:extLst>
+  </p:cSld>
+  <p:clrMapOvr>
+    <a:masterClrMapping/>
+  </p:clrMapOvr>
+</p:sld>
+</file>
+
+<file path=ppt/slides/slide3.xml><?xml version="1.0" encoding="utf-8"?>
 <p:sld xmlns:a="http://schemas.openxmlformats.org/drawingml/2006/main" xmlns:r="http://schemas.openxmlformats.org/officeDocument/2006/relationships" xmlns:p="http://schemas.openxmlformats.org/presentationml/2006/main">
   <p:cSld>
     <p:spTree>
@@ -21646,7 +23667,7 @@
 </p:sld>
 </file>
 
-<file path=ppt/slides/slide3.xml><?xml version="1.0" encoding="utf-8"?>
+<file path=ppt/slides/slide4.xml><?xml version="1.0" encoding="utf-8"?>
 <p:sld xmlns:a="http://schemas.openxmlformats.org/drawingml/2006/main" xmlns:r="http://schemas.openxmlformats.org/officeDocument/2006/relationships" xmlns:p="http://schemas.openxmlformats.org/presentationml/2006/main">
   <p:cSld>
     <p:spTree>
@@ -23294,19 +25315,8 @@
                 <a:latin typeface="Arial" panose="020B0604020202020204" pitchFamily="34" charset="0"/>
                 <a:cs typeface="Arial" panose="020B0604020202020204" pitchFamily="34" charset="0"/>
               </a:rPr>
-              <a:t>PKW hat den </a:t>
-            </a:r>
-            <a:r>
-              <a:rPr lang="de-DE" sz="1200">
-                <a:latin typeface="Arial" panose="020B0604020202020204" pitchFamily="34" charset="0"/>
-                <a:cs typeface="Arial" panose="020B0604020202020204" pitchFamily="34" charset="0"/>
-              </a:rPr>
-              <a:t>Ladevorgang beendet.</a:t>
-            </a:r>
-            <a:endParaRPr lang="de-DE" sz="1200" dirty="0">
-              <a:latin typeface="Arial" panose="020B0604020202020204" pitchFamily="34" charset="0"/>
-              <a:cs typeface="Arial" panose="020B0604020202020204" pitchFamily="34" charset="0"/>
-            </a:endParaRPr>
+              <a:t>PKW hat den Ladevorgang beendet.</a:t>
+            </a:r>
           </a:p>
         </p:txBody>
       </p:sp>
@@ -23618,7 +25628,7 @@
 </p:sld>
 </file>
 
-<file path=ppt/slides/slide4.xml><?xml version="1.0" encoding="utf-8"?>
+<file path=ppt/slides/slide5.xml><?xml version="1.0" encoding="utf-8"?>
 <p:sld xmlns:a="http://schemas.openxmlformats.org/drawingml/2006/main" xmlns:r="http://schemas.openxmlformats.org/officeDocument/2006/relationships" xmlns:p="http://schemas.openxmlformats.org/presentationml/2006/main">
   <p:cSld>
     <p:spTree>
@@ -23907,7 +25917,7 @@
 </p:sld>
 </file>
 
-<file path=ppt/slides/slide5.xml><?xml version="1.0" encoding="utf-8"?>
+<file path=ppt/slides/slide6.xml><?xml version="1.0" encoding="utf-8"?>
 <p:sld xmlns:a="http://schemas.openxmlformats.org/drawingml/2006/main" xmlns:r="http://schemas.openxmlformats.org/officeDocument/2006/relationships" xmlns:p="http://schemas.openxmlformats.org/presentationml/2006/main">
   <p:cSld>
     <p:spTree>
@@ -24119,7 +26129,7 @@
 </p:sld>
 </file>
 
-<file path=ppt/slides/slide6.xml><?xml version="1.0" encoding="utf-8"?>
+<file path=ppt/slides/slide7.xml><?xml version="1.0" encoding="utf-8"?>
 <p:sld xmlns:a="http://schemas.openxmlformats.org/drawingml/2006/main" xmlns:r="http://schemas.openxmlformats.org/officeDocument/2006/relationships" xmlns:p="http://schemas.openxmlformats.org/presentationml/2006/main">
   <p:cSld>
     <p:spTree>
@@ -25442,7 +27452,7 @@
 </p:sld>
 </file>
 
-<file path=ppt/slides/slide7.xml><?xml version="1.0" encoding="utf-8"?>
+<file path=ppt/slides/slide8.xml><?xml version="1.0" encoding="utf-8"?>
 <p:sld xmlns:a="http://schemas.openxmlformats.org/drawingml/2006/main" xmlns:r="http://schemas.openxmlformats.org/officeDocument/2006/relationships" xmlns:p="http://schemas.openxmlformats.org/presentationml/2006/main">
   <p:cSld>
     <p:spTree>
@@ -26323,7 +28333,7 @@
 </p:sld>
 </file>
 
-<file path=ppt/slides/slide8.xml><?xml version="1.0" encoding="utf-8"?>
+<file path=ppt/slides/slide9.xml><?xml version="1.0" encoding="utf-8"?>
 <p:sld xmlns:a="http://schemas.openxmlformats.org/drawingml/2006/main" xmlns:r="http://schemas.openxmlformats.org/officeDocument/2006/relationships" xmlns:p="http://schemas.openxmlformats.org/presentationml/2006/main">
   <p:cSld>
     <p:spTree>
@@ -30727,887 +32737,6 @@
     <p:extLst>
       <p:ext uri="{BB962C8B-B14F-4D97-AF65-F5344CB8AC3E}">
         <p14:creationId xmlns:p14="http://schemas.microsoft.com/office/powerpoint/2010/main" val="924432096"/>
-      </p:ext>
-    </p:extLst>
-  </p:cSld>
-  <p:clrMapOvr>
-    <a:masterClrMapping/>
-  </p:clrMapOvr>
-</p:sld>
-</file>
-
-<file path=ppt/slides/slide9.xml><?xml version="1.0" encoding="utf-8"?>
-<p:sld xmlns:a="http://schemas.openxmlformats.org/drawingml/2006/main" xmlns:r="http://schemas.openxmlformats.org/officeDocument/2006/relationships" xmlns:p="http://schemas.openxmlformats.org/presentationml/2006/main">
-  <p:cSld>
-    <p:spTree>
-      <p:nvGrpSpPr>
-        <p:cNvPr id="1" name=""/>
-        <p:cNvGrpSpPr/>
-        <p:nvPr/>
-      </p:nvGrpSpPr>
-      <p:grpSpPr>
-        <a:xfrm>
-          <a:off x="0" y="0"/>
-          <a:ext cx="0" cy="0"/>
-          <a:chOff x="0" y="0"/>
-          <a:chExt cx="0" cy="0"/>
-        </a:xfrm>
-      </p:grpSpPr>
-      <p:grpSp>
-        <p:nvGrpSpPr>
-          <p:cNvPr id="4" name="Gruppieren 3">
-            <a:extLst>
-              <a:ext uri="{FF2B5EF4-FFF2-40B4-BE49-F238E27FC236}">
-                <a16:creationId xmlns:a16="http://schemas.microsoft.com/office/drawing/2014/main" id="{A47D2134-E7F3-427C-BE74-140BE853B3E8}"/>
-              </a:ext>
-            </a:extLst>
-          </p:cNvPr>
-          <p:cNvGrpSpPr/>
-          <p:nvPr/>
-        </p:nvGrpSpPr>
-        <p:grpSpPr>
-          <a:xfrm>
-            <a:off x="2604832" y="1244867"/>
-            <a:ext cx="1786193" cy="4474162"/>
-            <a:chOff x="2604832" y="1244867"/>
-            <a:chExt cx="1786193" cy="4474162"/>
-          </a:xfrm>
-        </p:grpSpPr>
-        <p:sp>
-          <p:nvSpPr>
-            <p:cNvPr id="5" name="Ellipse 4">
-              <a:extLst>
-                <a:ext uri="{FF2B5EF4-FFF2-40B4-BE49-F238E27FC236}">
-                  <a16:creationId xmlns:a16="http://schemas.microsoft.com/office/drawing/2014/main" id="{687765AE-DB57-44E7-8F4C-4438697636B9}"/>
-                </a:ext>
-              </a:extLst>
-            </p:cNvPr>
-            <p:cNvSpPr/>
-            <p:nvPr/>
-          </p:nvSpPr>
-          <p:spPr>
-            <a:xfrm>
-              <a:off x="2604836" y="1244867"/>
-              <a:ext cx="1648327" cy="433137"/>
-            </a:xfrm>
-            <a:prstGeom prst="ellipse">
-              <a:avLst/>
-            </a:prstGeom>
-            <a:solidFill>
-              <a:schemeClr val="accent6">
-                <a:lumMod val="40000"/>
-                <a:lumOff val="60000"/>
-              </a:schemeClr>
-            </a:solidFill>
-            <a:ln w="6350">
-              <a:solidFill>
-                <a:schemeClr val="tx1"/>
-              </a:solidFill>
-            </a:ln>
-          </p:spPr>
-          <p:style>
-            <a:lnRef idx="2">
-              <a:schemeClr val="accent1">
-                <a:shade val="50000"/>
-              </a:schemeClr>
-            </a:lnRef>
-            <a:fillRef idx="1">
-              <a:schemeClr val="accent1"/>
-            </a:fillRef>
-            <a:effectRef idx="0">
-              <a:schemeClr val="accent1"/>
-            </a:effectRef>
-            <a:fontRef idx="minor">
-              <a:schemeClr val="lt1"/>
-            </a:fontRef>
-          </p:style>
-          <p:txBody>
-            <a:bodyPr rtlCol="0" anchor="ctr"/>
-            <a:lstStyle/>
-            <a:p>
-              <a:pPr algn="ctr"/>
-              <a:r>
-                <a:rPr lang="de-DE" sz="800" dirty="0" err="1">
-                  <a:solidFill>
-                    <a:schemeClr val="tx1"/>
-                  </a:solidFill>
-                </a:rPr>
-                <a:t>Charge_or_wait</a:t>
-              </a:r>
-              <a:endParaRPr lang="de-DE" sz="800" dirty="0">
-                <a:solidFill>
-                  <a:schemeClr val="tx1"/>
-                </a:solidFill>
-              </a:endParaRPr>
-            </a:p>
-          </p:txBody>
-        </p:sp>
-        <p:sp>
-          <p:nvSpPr>
-            <p:cNvPr id="6" name="Ellipse 5">
-              <a:extLst>
-                <a:ext uri="{FF2B5EF4-FFF2-40B4-BE49-F238E27FC236}">
-                  <a16:creationId xmlns:a16="http://schemas.microsoft.com/office/drawing/2014/main" id="{BA3661D8-A384-4F67-9CAF-9129AB209B64}"/>
-                </a:ext>
-              </a:extLst>
-            </p:cNvPr>
-            <p:cNvSpPr/>
-            <p:nvPr/>
-          </p:nvSpPr>
-          <p:spPr>
-            <a:xfrm>
-              <a:off x="2604835" y="3240362"/>
-              <a:ext cx="1648327" cy="433137"/>
-            </a:xfrm>
-            <a:prstGeom prst="ellipse">
-              <a:avLst/>
-            </a:prstGeom>
-            <a:solidFill>
-              <a:schemeClr val="accent6">
-                <a:lumMod val="40000"/>
-                <a:lumOff val="60000"/>
-              </a:schemeClr>
-            </a:solidFill>
-            <a:ln w="6350">
-              <a:solidFill>
-                <a:schemeClr val="tx1"/>
-              </a:solidFill>
-            </a:ln>
-          </p:spPr>
-          <p:style>
-            <a:lnRef idx="2">
-              <a:schemeClr val="accent1">
-                <a:shade val="50000"/>
-              </a:schemeClr>
-            </a:lnRef>
-            <a:fillRef idx="1">
-              <a:schemeClr val="accent1"/>
-            </a:fillRef>
-            <a:effectRef idx="0">
-              <a:schemeClr val="accent1"/>
-            </a:effectRef>
-            <a:fontRef idx="minor">
-              <a:schemeClr val="lt1"/>
-            </a:fontRef>
-          </p:style>
-          <p:txBody>
-            <a:bodyPr rtlCol="0" anchor="ctr"/>
-            <a:lstStyle/>
-            <a:p>
-              <a:pPr algn="ctr"/>
-              <a:r>
-                <a:rPr lang="de-DE" sz="800" dirty="0">
-                  <a:solidFill>
-                    <a:schemeClr val="tx1"/>
-                  </a:solidFill>
-                </a:rPr>
-                <a:t>Charge_16A</a:t>
-              </a:r>
-            </a:p>
-          </p:txBody>
-        </p:sp>
-        <p:cxnSp>
-          <p:nvCxnSpPr>
-            <p:cNvPr id="7" name="Gerade Verbindung mit Pfeil 6">
-              <a:extLst>
-                <a:ext uri="{FF2B5EF4-FFF2-40B4-BE49-F238E27FC236}">
-                  <a16:creationId xmlns:a16="http://schemas.microsoft.com/office/drawing/2014/main" id="{5753B4CF-EA33-403B-8AFF-0012B6DBDAA3}"/>
-                </a:ext>
-              </a:extLst>
-            </p:cNvPr>
-            <p:cNvCxnSpPr>
-              <a:cxnSpLocks/>
-              <a:stCxn id="5" idx="4"/>
-              <a:endCxn id="18" idx="0"/>
-            </p:cNvCxnSpPr>
-            <p:nvPr/>
-          </p:nvCxnSpPr>
-          <p:spPr>
-            <a:xfrm flipH="1">
-              <a:off x="3428996" y="1678004"/>
-              <a:ext cx="4" cy="597427"/>
-            </a:xfrm>
-            <a:prstGeom prst="straightConnector1">
-              <a:avLst/>
-            </a:prstGeom>
-            <a:ln>
-              <a:solidFill>
-                <a:schemeClr val="tx1"/>
-              </a:solidFill>
-              <a:tailEnd type="triangle"/>
-            </a:ln>
-          </p:spPr>
-          <p:style>
-            <a:lnRef idx="1">
-              <a:schemeClr val="accent1"/>
-            </a:lnRef>
-            <a:fillRef idx="0">
-              <a:schemeClr val="accent1"/>
-            </a:fillRef>
-            <a:effectRef idx="0">
-              <a:schemeClr val="accent1"/>
-            </a:effectRef>
-            <a:fontRef idx="minor">
-              <a:schemeClr val="tx1"/>
-            </a:fontRef>
-          </p:style>
-        </p:cxnSp>
-        <p:sp>
-          <p:nvSpPr>
-            <p:cNvPr id="8" name="Textfeld 7">
-              <a:extLst>
-                <a:ext uri="{FF2B5EF4-FFF2-40B4-BE49-F238E27FC236}">
-                  <a16:creationId xmlns:a16="http://schemas.microsoft.com/office/drawing/2014/main" id="{A6D0088A-26C9-4836-A8C4-83C376C20290}"/>
-                </a:ext>
-              </a:extLst>
-            </p:cNvPr>
-            <p:cNvSpPr txBox="1"/>
-            <p:nvPr/>
-          </p:nvSpPr>
-          <p:spPr>
-            <a:xfrm>
-              <a:off x="3378875" y="1835667"/>
-              <a:ext cx="1012150" cy="184666"/>
-            </a:xfrm>
-            <a:prstGeom prst="rect">
-              <a:avLst/>
-            </a:prstGeom>
-            <a:noFill/>
-          </p:spPr>
-          <p:txBody>
-            <a:bodyPr wrap="square" rtlCol="0">
-              <a:spAutoFit/>
-            </a:bodyPr>
-            <a:lstStyle/>
-            <a:p>
-              <a:r>
-                <a:rPr lang="de-DE" sz="600" dirty="0" err="1"/>
-                <a:t>PKW_testzyklus</a:t>
-              </a:r>
-              <a:r>
-                <a:rPr lang="de-DE" sz="600" dirty="0"/>
-                <a:t> == </a:t>
-              </a:r>
-              <a:r>
-                <a:rPr lang="de-DE" sz="600" dirty="0" err="1"/>
-                <a:t>False</a:t>
-              </a:r>
-              <a:endParaRPr lang="de-DE" sz="600" dirty="0"/>
-            </a:p>
-          </p:txBody>
-        </p:sp>
-        <p:sp>
-          <p:nvSpPr>
-            <p:cNvPr id="9" name="Ellipse 8">
-              <a:extLst>
-                <a:ext uri="{FF2B5EF4-FFF2-40B4-BE49-F238E27FC236}">
-                  <a16:creationId xmlns:a16="http://schemas.microsoft.com/office/drawing/2014/main" id="{206D2B92-A69B-4C99-8C28-90244C08063D}"/>
-                </a:ext>
-              </a:extLst>
-            </p:cNvPr>
-            <p:cNvSpPr/>
-            <p:nvPr/>
-          </p:nvSpPr>
-          <p:spPr>
-            <a:xfrm>
-              <a:off x="2604835" y="4263127"/>
-              <a:ext cx="1648327" cy="433137"/>
-            </a:xfrm>
-            <a:prstGeom prst="ellipse">
-              <a:avLst/>
-            </a:prstGeom>
-            <a:solidFill>
-              <a:schemeClr val="accent6">
-                <a:lumMod val="40000"/>
-                <a:lumOff val="60000"/>
-              </a:schemeClr>
-            </a:solidFill>
-            <a:ln w="6350">
-              <a:solidFill>
-                <a:schemeClr val="tx1"/>
-              </a:solidFill>
-            </a:ln>
-          </p:spPr>
-          <p:style>
-            <a:lnRef idx="2">
-              <a:schemeClr val="accent1">
-                <a:shade val="50000"/>
-              </a:schemeClr>
-            </a:lnRef>
-            <a:fillRef idx="1">
-              <a:schemeClr val="accent1"/>
-            </a:fillRef>
-            <a:effectRef idx="0">
-              <a:schemeClr val="accent1"/>
-            </a:effectRef>
-            <a:fontRef idx="minor">
-              <a:schemeClr val="lt1"/>
-            </a:fontRef>
-          </p:style>
-          <p:txBody>
-            <a:bodyPr rtlCol="0" anchor="ctr"/>
-            <a:lstStyle/>
-            <a:p>
-              <a:pPr algn="ctr"/>
-              <a:r>
-                <a:rPr lang="de-DE" sz="800" dirty="0">
-                  <a:solidFill>
-                    <a:schemeClr val="tx1"/>
-                  </a:solidFill>
-                </a:rPr>
-                <a:t>Charge_15A</a:t>
-              </a:r>
-            </a:p>
-          </p:txBody>
-        </p:sp>
-        <p:cxnSp>
-          <p:nvCxnSpPr>
-            <p:cNvPr id="10" name="Gerade Verbindung mit Pfeil 9">
-              <a:extLst>
-                <a:ext uri="{FF2B5EF4-FFF2-40B4-BE49-F238E27FC236}">
-                  <a16:creationId xmlns:a16="http://schemas.microsoft.com/office/drawing/2014/main" id="{58DC58AA-2938-4E29-82C0-C9E06F70E01D}"/>
-                </a:ext>
-              </a:extLst>
-            </p:cNvPr>
-            <p:cNvCxnSpPr>
-              <a:cxnSpLocks/>
-              <a:endCxn id="9" idx="0"/>
-            </p:cNvCxnSpPr>
-            <p:nvPr/>
-          </p:nvCxnSpPr>
-          <p:spPr>
-            <a:xfrm flipH="1">
-              <a:off x="3428999" y="3672327"/>
-              <a:ext cx="1" cy="590800"/>
-            </a:xfrm>
-            <a:prstGeom prst="straightConnector1">
-              <a:avLst/>
-            </a:prstGeom>
-            <a:ln>
-              <a:solidFill>
-                <a:schemeClr val="tx1"/>
-              </a:solidFill>
-              <a:tailEnd type="triangle"/>
-            </a:ln>
-          </p:spPr>
-          <p:style>
-            <a:lnRef idx="1">
-              <a:schemeClr val="accent1"/>
-            </a:lnRef>
-            <a:fillRef idx="0">
-              <a:schemeClr val="accent1"/>
-            </a:fillRef>
-            <a:effectRef idx="0">
-              <a:schemeClr val="accent1"/>
-            </a:effectRef>
-            <a:fontRef idx="minor">
-              <a:schemeClr val="tx1"/>
-            </a:fontRef>
-          </p:style>
-        </p:cxnSp>
-        <p:sp>
-          <p:nvSpPr>
-            <p:cNvPr id="11" name="Ellipse 10">
-              <a:extLst>
-                <a:ext uri="{FF2B5EF4-FFF2-40B4-BE49-F238E27FC236}">
-                  <a16:creationId xmlns:a16="http://schemas.microsoft.com/office/drawing/2014/main" id="{C7BD1FFE-8B92-4686-97E7-ECBA91197BDD}"/>
-                </a:ext>
-              </a:extLst>
-            </p:cNvPr>
-            <p:cNvSpPr/>
-            <p:nvPr/>
-          </p:nvSpPr>
-          <p:spPr>
-            <a:xfrm>
-              <a:off x="2604835" y="5285892"/>
-              <a:ext cx="1648327" cy="433137"/>
-            </a:xfrm>
-            <a:prstGeom prst="ellipse">
-              <a:avLst/>
-            </a:prstGeom>
-            <a:solidFill>
-              <a:schemeClr val="accent6">
-                <a:lumMod val="40000"/>
-                <a:lumOff val="60000"/>
-              </a:schemeClr>
-            </a:solidFill>
-            <a:ln w="6350">
-              <a:solidFill>
-                <a:schemeClr val="tx1"/>
-              </a:solidFill>
-            </a:ln>
-          </p:spPr>
-          <p:style>
-            <a:lnRef idx="2">
-              <a:schemeClr val="accent1">
-                <a:shade val="50000"/>
-              </a:schemeClr>
-            </a:lnRef>
-            <a:fillRef idx="1">
-              <a:schemeClr val="accent1"/>
-            </a:fillRef>
-            <a:effectRef idx="0">
-              <a:schemeClr val="accent1"/>
-            </a:effectRef>
-            <a:fontRef idx="minor">
-              <a:schemeClr val="lt1"/>
-            </a:fontRef>
-          </p:style>
-          <p:txBody>
-            <a:bodyPr rtlCol="0" anchor="ctr"/>
-            <a:lstStyle/>
-            <a:p>
-              <a:pPr algn="ctr"/>
-              <a:r>
-                <a:rPr lang="de-DE" sz="800" dirty="0">
-                  <a:solidFill>
-                    <a:schemeClr val="tx1"/>
-                  </a:solidFill>
-                </a:rPr>
-                <a:t>Charge_6A</a:t>
-              </a:r>
-            </a:p>
-          </p:txBody>
-        </p:sp>
-        <p:cxnSp>
-          <p:nvCxnSpPr>
-            <p:cNvPr id="12" name="Gerade Verbindung mit Pfeil 11">
-              <a:extLst>
-                <a:ext uri="{FF2B5EF4-FFF2-40B4-BE49-F238E27FC236}">
-                  <a16:creationId xmlns:a16="http://schemas.microsoft.com/office/drawing/2014/main" id="{3132501B-2837-4FDD-8CC0-19D270922F4D}"/>
-                </a:ext>
-              </a:extLst>
-            </p:cNvPr>
-            <p:cNvCxnSpPr>
-              <a:cxnSpLocks/>
-              <a:endCxn id="11" idx="0"/>
-            </p:cNvCxnSpPr>
-            <p:nvPr/>
-          </p:nvCxnSpPr>
-          <p:spPr>
-            <a:xfrm>
-              <a:off x="3428999" y="4972058"/>
-              <a:ext cx="0" cy="313834"/>
-            </a:xfrm>
-            <a:prstGeom prst="straightConnector1">
-              <a:avLst/>
-            </a:prstGeom>
-            <a:ln>
-              <a:solidFill>
-                <a:schemeClr val="tx1"/>
-              </a:solidFill>
-              <a:prstDash val="lgDash"/>
-              <a:tailEnd type="triangle"/>
-            </a:ln>
-          </p:spPr>
-          <p:style>
-            <a:lnRef idx="1">
-              <a:schemeClr val="accent1"/>
-            </a:lnRef>
-            <a:fillRef idx="0">
-              <a:schemeClr val="accent1"/>
-            </a:fillRef>
-            <a:effectRef idx="0">
-              <a:schemeClr val="accent1"/>
-            </a:effectRef>
-            <a:fontRef idx="minor">
-              <a:schemeClr val="tx1"/>
-            </a:fontRef>
-          </p:style>
-        </p:cxnSp>
-        <p:cxnSp>
-          <p:nvCxnSpPr>
-            <p:cNvPr id="13" name="Gerade Verbindung mit Pfeil 12">
-              <a:extLst>
-                <a:ext uri="{FF2B5EF4-FFF2-40B4-BE49-F238E27FC236}">
-                  <a16:creationId xmlns:a16="http://schemas.microsoft.com/office/drawing/2014/main" id="{2D0CC33F-9BA4-47CF-A954-E24B5A230C2D}"/>
-                </a:ext>
-              </a:extLst>
-            </p:cNvPr>
-            <p:cNvCxnSpPr>
-              <a:cxnSpLocks/>
-            </p:cNvCxnSpPr>
-            <p:nvPr/>
-          </p:nvCxnSpPr>
-          <p:spPr>
-            <a:xfrm>
-              <a:off x="3428999" y="4696264"/>
-              <a:ext cx="0" cy="313834"/>
-            </a:xfrm>
-            <a:prstGeom prst="straightConnector1">
-              <a:avLst/>
-            </a:prstGeom>
-            <a:ln>
-              <a:solidFill>
-                <a:schemeClr val="tx1"/>
-              </a:solidFill>
-              <a:prstDash val="lgDash"/>
-              <a:tailEnd type="triangle"/>
-            </a:ln>
-          </p:spPr>
-          <p:style>
-            <a:lnRef idx="1">
-              <a:schemeClr val="accent1"/>
-            </a:lnRef>
-            <a:fillRef idx="0">
-              <a:schemeClr val="accent1"/>
-            </a:fillRef>
-            <a:effectRef idx="0">
-              <a:schemeClr val="accent1"/>
-            </a:effectRef>
-            <a:fontRef idx="minor">
-              <a:schemeClr val="tx1"/>
-            </a:fontRef>
-          </p:style>
-        </p:cxnSp>
-        <p:sp>
-          <p:nvSpPr>
-            <p:cNvPr id="14" name="Textfeld 13">
-              <a:extLst>
-                <a:ext uri="{FF2B5EF4-FFF2-40B4-BE49-F238E27FC236}">
-                  <a16:creationId xmlns:a16="http://schemas.microsoft.com/office/drawing/2014/main" id="{B88EBF46-0F23-41FE-8E50-D567D08F54A7}"/>
-                </a:ext>
-              </a:extLst>
-            </p:cNvPr>
-            <p:cNvSpPr txBox="1"/>
-            <p:nvPr/>
-          </p:nvSpPr>
-          <p:spPr>
-            <a:xfrm>
-              <a:off x="3378875" y="3840269"/>
-              <a:ext cx="759700" cy="184666"/>
-            </a:xfrm>
-            <a:prstGeom prst="rect">
-              <a:avLst/>
-            </a:prstGeom>
-            <a:noFill/>
-          </p:spPr>
-          <p:txBody>
-            <a:bodyPr wrap="square" rtlCol="0">
-              <a:spAutoFit/>
-            </a:bodyPr>
-            <a:lstStyle/>
-            <a:p>
-              <a:r>
-                <a:rPr lang="de-DE" sz="600" dirty="0"/>
-                <a:t>Delta_t1 == True</a:t>
-              </a:r>
-            </a:p>
-          </p:txBody>
-        </p:sp>
-        <p:sp>
-          <p:nvSpPr>
-            <p:cNvPr id="15" name="Textfeld 14">
-              <a:extLst>
-                <a:ext uri="{FF2B5EF4-FFF2-40B4-BE49-F238E27FC236}">
-                  <a16:creationId xmlns:a16="http://schemas.microsoft.com/office/drawing/2014/main" id="{3AF983B3-4587-4786-A03F-60689B638C22}"/>
-                </a:ext>
-              </a:extLst>
-            </p:cNvPr>
-            <p:cNvSpPr txBox="1"/>
-            <p:nvPr/>
-          </p:nvSpPr>
-          <p:spPr>
-            <a:xfrm>
-              <a:off x="3378875" y="4728166"/>
-              <a:ext cx="835932" cy="184666"/>
-            </a:xfrm>
-            <a:prstGeom prst="rect">
-              <a:avLst/>
-            </a:prstGeom>
-            <a:noFill/>
-          </p:spPr>
-          <p:txBody>
-            <a:bodyPr wrap="square" rtlCol="0">
-              <a:spAutoFit/>
-            </a:bodyPr>
-            <a:lstStyle/>
-            <a:p>
-              <a:r>
-                <a:rPr lang="de-DE" sz="600" dirty="0"/>
-                <a:t>Delta_t2 == True</a:t>
-              </a:r>
-            </a:p>
-          </p:txBody>
-        </p:sp>
-        <p:sp>
-          <p:nvSpPr>
-            <p:cNvPr id="16" name="Textfeld 15">
-              <a:extLst>
-                <a:ext uri="{FF2B5EF4-FFF2-40B4-BE49-F238E27FC236}">
-                  <a16:creationId xmlns:a16="http://schemas.microsoft.com/office/drawing/2014/main" id="{606F93B8-7F9F-44CD-B951-02621D03DE55}"/>
-                </a:ext>
-              </a:extLst>
-            </p:cNvPr>
-            <p:cNvSpPr txBox="1"/>
-            <p:nvPr/>
-          </p:nvSpPr>
-          <p:spPr>
-            <a:xfrm>
-              <a:off x="3378875" y="4996451"/>
-              <a:ext cx="797838" cy="184666"/>
-            </a:xfrm>
-            <a:prstGeom prst="rect">
-              <a:avLst/>
-            </a:prstGeom>
-            <a:noFill/>
-          </p:spPr>
-          <p:txBody>
-            <a:bodyPr wrap="square" rtlCol="0">
-              <a:spAutoFit/>
-            </a:bodyPr>
-            <a:lstStyle/>
-            <a:p>
-              <a:r>
-                <a:rPr lang="de-DE" sz="600" dirty="0"/>
-                <a:t>Delta_t10 == True</a:t>
-              </a:r>
-            </a:p>
-          </p:txBody>
-        </p:sp>
-        <p:cxnSp>
-          <p:nvCxnSpPr>
-            <p:cNvPr id="17" name="Verbinder: gewinkelt 16">
-              <a:extLst>
-                <a:ext uri="{FF2B5EF4-FFF2-40B4-BE49-F238E27FC236}">
-                  <a16:creationId xmlns:a16="http://schemas.microsoft.com/office/drawing/2014/main" id="{EEF2256D-9B2F-457A-9884-A3E432ECB74E}"/>
-                </a:ext>
-              </a:extLst>
-            </p:cNvPr>
-            <p:cNvCxnSpPr>
-              <a:cxnSpLocks/>
-              <a:stCxn id="11" idx="2"/>
-              <a:endCxn id="5" idx="2"/>
-            </p:cNvCxnSpPr>
-            <p:nvPr/>
-          </p:nvCxnSpPr>
-          <p:spPr>
-            <a:xfrm rot="10800000" flipH="1">
-              <a:off x="2604834" y="1461437"/>
-              <a:ext cx="1" cy="4041025"/>
-            </a:xfrm>
-            <a:prstGeom prst="bentConnector3">
-              <a:avLst>
-                <a:gd name="adj1" fmla="val -22860000000"/>
-              </a:avLst>
-            </a:prstGeom>
-            <a:ln>
-              <a:solidFill>
-                <a:schemeClr val="tx1"/>
-              </a:solidFill>
-              <a:tailEnd type="triangle"/>
-            </a:ln>
-          </p:spPr>
-          <p:style>
-            <a:lnRef idx="1">
-              <a:schemeClr val="accent1"/>
-            </a:lnRef>
-            <a:fillRef idx="0">
-              <a:schemeClr val="accent1"/>
-            </a:fillRef>
-            <a:effectRef idx="0">
-              <a:schemeClr val="accent1"/>
-            </a:effectRef>
-            <a:fontRef idx="minor">
-              <a:schemeClr val="tx1"/>
-            </a:fontRef>
-          </p:style>
-        </p:cxnSp>
-        <p:sp>
-          <p:nvSpPr>
-            <p:cNvPr id="18" name="Ellipse 17">
-              <a:extLst>
-                <a:ext uri="{FF2B5EF4-FFF2-40B4-BE49-F238E27FC236}">
-                  <a16:creationId xmlns:a16="http://schemas.microsoft.com/office/drawing/2014/main" id="{5C58D7B5-2B2E-46EA-80EC-236697D69E74}"/>
-                </a:ext>
-              </a:extLst>
-            </p:cNvPr>
-            <p:cNvSpPr/>
-            <p:nvPr/>
-          </p:nvSpPr>
-          <p:spPr>
-            <a:xfrm>
-              <a:off x="2604832" y="2275431"/>
-              <a:ext cx="1648327" cy="433137"/>
-            </a:xfrm>
-            <a:prstGeom prst="ellipse">
-              <a:avLst/>
-            </a:prstGeom>
-            <a:solidFill>
-              <a:schemeClr val="accent6">
-                <a:lumMod val="40000"/>
-                <a:lumOff val="60000"/>
-              </a:schemeClr>
-            </a:solidFill>
-            <a:ln w="6350">
-              <a:solidFill>
-                <a:schemeClr val="tx1"/>
-              </a:solidFill>
-            </a:ln>
-          </p:spPr>
-          <p:style>
-            <a:lnRef idx="2">
-              <a:schemeClr val="accent1">
-                <a:shade val="50000"/>
-              </a:schemeClr>
-            </a:lnRef>
-            <a:fillRef idx="1">
-              <a:schemeClr val="accent1"/>
-            </a:fillRef>
-            <a:effectRef idx="0">
-              <a:schemeClr val="accent1"/>
-            </a:effectRef>
-            <a:fontRef idx="minor">
-              <a:schemeClr val="lt1"/>
-            </a:fontRef>
-          </p:style>
-          <p:txBody>
-            <a:bodyPr rtlCol="0" anchor="ctr"/>
-            <a:lstStyle/>
-            <a:p>
-              <a:pPr algn="ctr"/>
-              <a:r>
-                <a:rPr lang="de-DE" sz="800" dirty="0" err="1">
-                  <a:solidFill>
-                    <a:schemeClr val="tx1"/>
-                  </a:solidFill>
-                </a:rPr>
-                <a:t>Kapazität_freischalten</a:t>
-              </a:r>
-              <a:endParaRPr lang="de-DE" sz="800" dirty="0">
-                <a:solidFill>
-                  <a:schemeClr val="tx1"/>
-                </a:solidFill>
-              </a:endParaRPr>
-            </a:p>
-          </p:txBody>
-        </p:sp>
-        <p:cxnSp>
-          <p:nvCxnSpPr>
-            <p:cNvPr id="19" name="Gerade Verbindung mit Pfeil 18">
-              <a:extLst>
-                <a:ext uri="{FF2B5EF4-FFF2-40B4-BE49-F238E27FC236}">
-                  <a16:creationId xmlns:a16="http://schemas.microsoft.com/office/drawing/2014/main" id="{D9ECE6B7-81BD-4764-A742-EDA004568F2F}"/>
-                </a:ext>
-              </a:extLst>
-            </p:cNvPr>
-            <p:cNvCxnSpPr>
-              <a:cxnSpLocks/>
-              <a:stCxn id="18" idx="4"/>
-              <a:endCxn id="6" idx="0"/>
-            </p:cNvCxnSpPr>
-            <p:nvPr/>
-          </p:nvCxnSpPr>
-          <p:spPr>
-            <a:xfrm>
-              <a:off x="3428996" y="2708568"/>
-              <a:ext cx="3" cy="531794"/>
-            </a:xfrm>
-            <a:prstGeom prst="straightConnector1">
-              <a:avLst/>
-            </a:prstGeom>
-            <a:ln>
-              <a:solidFill>
-                <a:schemeClr val="tx1"/>
-              </a:solidFill>
-              <a:tailEnd type="triangle"/>
-            </a:ln>
-          </p:spPr>
-          <p:style>
-            <a:lnRef idx="1">
-              <a:schemeClr val="accent1"/>
-            </a:lnRef>
-            <a:fillRef idx="0">
-              <a:schemeClr val="accent1"/>
-            </a:fillRef>
-            <a:effectRef idx="0">
-              <a:schemeClr val="accent1"/>
-            </a:effectRef>
-            <a:fontRef idx="minor">
-              <a:schemeClr val="tx1"/>
-            </a:fontRef>
-          </p:style>
-        </p:cxnSp>
-        <p:sp>
-          <p:nvSpPr>
-            <p:cNvPr id="20" name="Textfeld 19">
-              <a:extLst>
-                <a:ext uri="{FF2B5EF4-FFF2-40B4-BE49-F238E27FC236}">
-                  <a16:creationId xmlns:a16="http://schemas.microsoft.com/office/drawing/2014/main" id="{2561A1E4-5A17-4026-9918-E62767FFE969}"/>
-                </a:ext>
-              </a:extLst>
-            </p:cNvPr>
-            <p:cNvSpPr txBox="1"/>
-            <p:nvPr/>
-          </p:nvSpPr>
-          <p:spPr>
-            <a:xfrm>
-              <a:off x="3378875" y="2844267"/>
-              <a:ext cx="759720" cy="184666"/>
-            </a:xfrm>
-            <a:prstGeom prst="rect">
-              <a:avLst/>
-            </a:prstGeom>
-            <a:noFill/>
-          </p:spPr>
-          <p:txBody>
-            <a:bodyPr wrap="square" rtlCol="0">
-              <a:spAutoFit/>
-            </a:bodyPr>
-            <a:lstStyle/>
-            <a:p>
-              <a:r>
-                <a:rPr lang="de-DE" sz="600" dirty="0" err="1"/>
-                <a:t>Kapa_frei</a:t>
-              </a:r>
-              <a:r>
-                <a:rPr lang="de-DE" sz="600" dirty="0"/>
-                <a:t> == True</a:t>
-              </a:r>
-            </a:p>
-          </p:txBody>
-        </p:sp>
-      </p:grpSp>
-      <p:sp>
-        <p:nvSpPr>
-          <p:cNvPr id="21" name="Textfeld 20">
-            <a:extLst>
-              <a:ext uri="{FF2B5EF4-FFF2-40B4-BE49-F238E27FC236}">
-                <a16:creationId xmlns:a16="http://schemas.microsoft.com/office/drawing/2014/main" id="{A3598F0C-3217-4F5C-8C42-81F8C45A1302}"/>
-              </a:ext>
-            </a:extLst>
-          </p:cNvPr>
-          <p:cNvSpPr txBox="1"/>
-          <p:nvPr/>
-        </p:nvSpPr>
-        <p:spPr>
-          <a:xfrm>
-            <a:off x="680720" y="248920"/>
-            <a:ext cx="5496518" cy="369332"/>
-          </a:xfrm>
-          <a:prstGeom prst="rect">
-            <a:avLst/>
-          </a:prstGeom>
-          <a:noFill/>
-        </p:spPr>
-        <p:txBody>
-          <a:bodyPr wrap="square" rtlCol="0">
-            <a:spAutoFit/>
-          </a:bodyPr>
-          <a:lstStyle/>
-          <a:p>
-            <a:pPr algn="ctr"/>
-            <a:r>
-              <a:rPr lang="de-DE" dirty="0"/>
-              <a:t>Ablaufdiagramm Java Regelalgorithmus</a:t>
-            </a:r>
-          </a:p>
-        </p:txBody>
-      </p:sp>
-    </p:spTree>
-    <p:extLst>
-      <p:ext uri="{BB962C8B-B14F-4D97-AF65-F5344CB8AC3E}">
-        <p14:creationId xmlns:p14="http://schemas.microsoft.com/office/powerpoint/2010/main" val="1224209538"/>
       </p:ext>
     </p:extLst>
   </p:cSld>
@@ -32174,6 +33303,15 @@
 </file>
 
 <file path=customXml/item1.xml><?xml version="1.0" encoding="utf-8"?>
+<?mso-contentType ?>
+<FormTemplates xmlns="http://schemas.microsoft.com/sharepoint/v3/contenttype/forms">
+  <Display>DocumentLibraryForm</Display>
+  <Edit>DocumentLibraryForm</Edit>
+  <New>DocumentLibraryForm</New>
+</FormTemplates>
+</file>
+
+<file path=customXml/item2.xml><?xml version="1.0" encoding="utf-8"?>
 <ct:contentTypeSchema xmlns:ct="http://schemas.microsoft.com/office/2006/metadata/contentType" xmlns:ma="http://schemas.microsoft.com/office/2006/metadata/properties/metaAttributes" ct:_="" ma:_="" ma:contentTypeName="Document" ma:contentTypeID="0x0101008D794A3DFD76A64D962E6D1A78E9D7A1" ma:contentTypeVersion="6" ma:contentTypeDescription="Create a new document." ma:contentTypeScope="" ma:versionID="a5a44b0c321a301d2199ee9a9fb45390">
   <xsd:schema xmlns:xsd="http://www.w3.org/2001/XMLSchema" xmlns:xs="http://www.w3.org/2001/XMLSchema" xmlns:p="http://schemas.microsoft.com/office/2006/metadata/properties" xmlns:ns3="c57ff1c2-e5c4-47f1-8f0a-654672b27731" targetNamespace="http://schemas.microsoft.com/office/2006/metadata/properties" ma:root="true" ma:fieldsID="0d65387667e118fe058674a9e63284cd" ns3:_="">
     <xsd:import namespace="c57ff1c2-e5c4-47f1-8f0a-654672b27731"/>
@@ -32331,15 +33469,6 @@
 </ct:contentTypeSchema>
 </file>
 
-<file path=customXml/item2.xml><?xml version="1.0" encoding="utf-8"?>
-<?mso-contentType ?>
-<FormTemplates xmlns="http://schemas.microsoft.com/sharepoint/v3/contenttype/forms">
-  <Display>DocumentLibraryForm</Display>
-  <Edit>DocumentLibraryForm</Edit>
-  <New>DocumentLibraryForm</New>
-</FormTemplates>
-</file>
-
 <file path=customXml/item3.xml><?xml version="1.0" encoding="utf-8"?>
 <p:properties xmlns:p="http://schemas.microsoft.com/office/2006/metadata/properties" xmlns:xsi="http://www.w3.org/2001/XMLSchema-instance" xmlns:pc="http://schemas.microsoft.com/office/infopath/2007/PartnerControls">
   <documentManagement/>
@@ -32347,6 +33476,14 @@
 </file>
 
 <file path=customXml/itemProps1.xml><?xml version="1.0" encoding="utf-8"?>
+<ds:datastoreItem xmlns:ds="http://schemas.openxmlformats.org/officeDocument/2006/customXml" ds:itemID="{51304325-EE51-4814-B3A9-DC7BF6DF7C66}">
+  <ds:schemaRefs>
+    <ds:schemaRef ds:uri="http://schemas.microsoft.com/sharepoint/v3/contenttype/forms"/>
+  </ds:schemaRefs>
+</ds:datastoreItem>
+</file>
+
+<file path=customXml/itemProps2.xml><?xml version="1.0" encoding="utf-8"?>
 <ds:datastoreItem xmlns:ds="http://schemas.openxmlformats.org/officeDocument/2006/customXml" ds:itemID="{2FED92D8-9E04-4229-911F-6E06FF71168B}">
   <ds:schemaRefs>
     <ds:schemaRef ds:uri="http://schemas.microsoft.com/office/2006/metadata/contentType"/>
@@ -32364,26 +33501,18 @@
 </ds:datastoreItem>
 </file>
 
-<file path=customXml/itemProps2.xml><?xml version="1.0" encoding="utf-8"?>
-<ds:datastoreItem xmlns:ds="http://schemas.openxmlformats.org/officeDocument/2006/customXml" ds:itemID="{51304325-EE51-4814-B3A9-DC7BF6DF7C66}">
-  <ds:schemaRefs>
-    <ds:schemaRef ds:uri="http://schemas.microsoft.com/sharepoint/v3/contenttype/forms"/>
-  </ds:schemaRefs>
-</ds:datastoreItem>
-</file>
-
 <file path=customXml/itemProps3.xml><?xml version="1.0" encoding="utf-8"?>
 <ds:datastoreItem xmlns:ds="http://schemas.openxmlformats.org/officeDocument/2006/customXml" ds:itemID="{5FAF9800-8C90-45BC-B30D-EA05CF3DB546}">
   <ds:schemaRefs>
-    <ds:schemaRef ds:uri="http://schemas.microsoft.com/office/2006/metadata/properties"/>
+    <ds:schemaRef ds:uri="http://purl.org/dc/elements/1.1/"/>
     <ds:schemaRef ds:uri="http://purl.org/dc/terms/"/>
-    <ds:schemaRef ds:uri="http://schemas.openxmlformats.org/package/2006/metadata/core-properties"/>
+    <ds:schemaRef ds:uri="http://www.w3.org/XML/1998/namespace"/>
     <ds:schemaRef ds:uri="http://purl.org/dc/dcmitype/"/>
     <ds:schemaRef ds:uri="http://schemas.microsoft.com/office/2006/documentManagement/types"/>
-    <ds:schemaRef ds:uri="http://purl.org/dc/elements/1.1/"/>
+    <ds:schemaRef ds:uri="http://schemas.microsoft.com/office/2006/metadata/properties"/>
     <ds:schemaRef ds:uri="http://schemas.microsoft.com/office/infopath/2007/PartnerControls"/>
+    <ds:schemaRef ds:uri="http://schemas.openxmlformats.org/package/2006/metadata/core-properties"/>
     <ds:schemaRef ds:uri="c57ff1c2-e5c4-47f1-8f0a-654672b27731"/>
-    <ds:schemaRef ds:uri="http://www.w3.org/XML/1998/namespace"/>
   </ds:schemaRefs>
 </ds:datastoreItem>
 </file>
</xml_diff>